<commit_message>
Update Front End Development.pptx
</commit_message>
<xml_diff>
--- a/Front End Development.pptx
+++ b/Front End Development.pptx
@@ -5,7 +5,7 @@
     <p:sldMasterId id="2147483648" r:id="rId1"/>
   </p:sldMasterIdLst>
   <p:notesMasterIdLst>
-    <p:notesMasterId r:id="rId22"/>
+    <p:notesMasterId r:id="rId25"/>
   </p:notesMasterIdLst>
   <p:sldIdLst>
     <p:sldId id="303" r:id="rId2"/>
@@ -16,18 +16,21 @@
     <p:sldId id="461" r:id="rId7"/>
     <p:sldId id="467" r:id="rId8"/>
     <p:sldId id="462" r:id="rId9"/>
-    <p:sldId id="468" r:id="rId10"/>
-    <p:sldId id="469" r:id="rId11"/>
-    <p:sldId id="470" r:id="rId12"/>
-    <p:sldId id="472" r:id="rId13"/>
-    <p:sldId id="473" r:id="rId14"/>
-    <p:sldId id="475" r:id="rId15"/>
-    <p:sldId id="476" r:id="rId16"/>
-    <p:sldId id="477" r:id="rId17"/>
-    <p:sldId id="474" r:id="rId18"/>
-    <p:sldId id="478" r:id="rId19"/>
-    <p:sldId id="463" r:id="rId20"/>
-    <p:sldId id="300" r:id="rId21"/>
+    <p:sldId id="481" r:id="rId10"/>
+    <p:sldId id="468" r:id="rId11"/>
+    <p:sldId id="469" r:id="rId12"/>
+    <p:sldId id="470" r:id="rId13"/>
+    <p:sldId id="472" r:id="rId14"/>
+    <p:sldId id="473" r:id="rId15"/>
+    <p:sldId id="475" r:id="rId16"/>
+    <p:sldId id="476" r:id="rId17"/>
+    <p:sldId id="477" r:id="rId18"/>
+    <p:sldId id="474" r:id="rId19"/>
+    <p:sldId id="478" r:id="rId20"/>
+    <p:sldId id="463" r:id="rId21"/>
+    <p:sldId id="480" r:id="rId22"/>
+    <p:sldId id="479" r:id="rId23"/>
+    <p:sldId id="300" r:id="rId24"/>
   </p:sldIdLst>
   <p:sldSz cx="12192000" cy="6858000"/>
   <p:notesSz cx="6858000" cy="9144000"/>
@@ -230,7 +233,7 @@
           <a:p>
             <a:fld id="{FE0F1FEC-2C6F-5847-AE6B-823559EA0680}" type="datetimeFigureOut">
               <a:rPr lang="pt-PT" smtClean="0"/>
-              <a:t>10/01/2019</a:t>
+              <a:t>11/01/2019</a:t>
             </a:fld>
             <a:endParaRPr lang="pt-PT"/>
           </a:p>
@@ -4978,24 +4981,84 @@
           <a:p>
             <a:r>
               <a:rPr lang="en-GB" dirty="0"/>
-              <a:t>Changes in </a:t>
-            </a:r>
+              <a:t>Project structure</a:t>
+            </a:r>
+          </a:p>
+          <a:p>
+            <a:pPr lvl="1"/>
+            <a:r>
+              <a:rPr lang="en-GB" dirty="0" err="1"/>
+              <a:t>Node_modules</a:t>
+            </a:r>
+            <a:r>
+              <a:rPr lang="en-GB" dirty="0"/>
+              <a:t> – </a:t>
+            </a:r>
+            <a:r>
+              <a:rPr lang="en-GB" dirty="0" err="1"/>
+              <a:t>npm</a:t>
+            </a:r>
+            <a:r>
+              <a:rPr lang="en-GB" dirty="0"/>
+              <a:t> </a:t>
+            </a:r>
+            <a:r>
+              <a:rPr lang="en-GB" dirty="0" err="1"/>
+              <a:t>eg</a:t>
+            </a:r>
+            <a:r>
+              <a:rPr lang="en-GB" dirty="0"/>
+              <a:t> </a:t>
+            </a:r>
+            <a:r>
+              <a:rPr lang="en-GB" dirty="0" err="1"/>
+              <a:t>ngx</a:t>
+            </a:r>
+            <a:r>
+              <a:rPr lang="en-GB" dirty="0"/>
+              <a:t>-charts</a:t>
+            </a:r>
+          </a:p>
+          <a:p>
+            <a:pPr lvl="1"/>
+            <a:r>
+              <a:rPr lang="en-GB" dirty="0" err="1"/>
+              <a:t>src</a:t>
+            </a:r>
+            <a:r>
+              <a:rPr lang="en-GB" dirty="0"/>
+              <a:t>\app</a:t>
+            </a:r>
+          </a:p>
+          <a:p>
+            <a:pPr lvl="1"/>
+            <a:r>
+              <a:rPr lang="en-GB" dirty="0"/>
+              <a:t>Index.html</a:t>
+            </a:r>
+          </a:p>
+          <a:p>
+            <a:pPr lvl="1"/>
+            <a:r>
+              <a:rPr lang="en-GB" dirty="0" err="1"/>
+              <a:t>app.module.ts</a:t>
+            </a:r>
+            <a:endParaRPr lang="en-GB" dirty="0"/>
+          </a:p>
+          <a:p>
+            <a:pPr lvl="1"/>
             <a:r>
               <a:rPr lang="en-GB" dirty="0" err="1"/>
               <a:t>app.component.ts</a:t>
             </a:r>
-            <a:endParaRPr lang="en-GB" dirty="0"/>
+            <a:r>
+              <a:rPr lang="en-GB" dirty="0"/>
+              <a:t> // html</a:t>
+            </a:r>
           </a:p>
           <a:p>
             <a:pPr lvl="1"/>
             <a:endParaRPr lang="en-GB" dirty="0"/>
-          </a:p>
-          <a:p>
-            <a:pPr lvl="1"/>
-            <a:r>
-              <a:rPr lang="en-GB" dirty="0"/>
-              <a:t>Try it,  change title property, add a property and add it as {{}} in the HTML</a:t>
-            </a:r>
           </a:p>
           <a:p>
             <a:pPr lvl="1"/>
@@ -5003,7 +5066,7 @@
               <a:rPr lang="en-GB" dirty="0">
                 <a:hlinkClick r:id="rId2"/>
               </a:rPr>
-              <a:t>https://www.udemy.com/the-complete-guide-to-angular-2/learn/v4/t/lecture/6655704?start=0</a:t>
+              <a:t>https://www.udemy.com/the-complete-guide-to-angular-2/learn/v4/t/lecture/10415892?start=0</a:t>
             </a:r>
             <a:endParaRPr lang="en-GB" dirty="0"/>
           </a:p>
@@ -5039,7 +5102,7 @@
           <a:p>
             <a:r>
               <a:rPr lang="en-GB" dirty="0"/>
-              <a:t>ex2 - First App</a:t>
+              <a:t>ex1 - First App</a:t>
             </a:r>
           </a:p>
         </p:txBody>
@@ -5047,7 +5110,7 @@
     </p:spTree>
     <p:extLst>
       <p:ext uri="{BB962C8B-B14F-4D97-AF65-F5344CB8AC3E}">
-        <p14:creationId xmlns:p14="http://schemas.microsoft.com/office/powerpoint/2010/main" val="2789295655"/>
+        <p14:creationId xmlns:p14="http://schemas.microsoft.com/office/powerpoint/2010/main" val="1638000734"/>
       </p:ext>
     </p:extLst>
   </p:cSld>
@@ -5079,7 +5142,7 @@
           <p:cNvPr id="2" name="Content Placeholder 1">
             <a:extLst>
               <a:ext uri="{FF2B5EF4-FFF2-40B4-BE49-F238E27FC236}">
-                <a16:creationId xmlns:a16="http://schemas.microsoft.com/office/drawing/2014/main" id="{7E953881-B8E2-49B6-9BD9-62181672C39A}"/>
+                <a16:creationId xmlns:a16="http://schemas.microsoft.com/office/drawing/2014/main" id="{E57AB6A8-9B56-4F42-BA1F-D0BB1F9C0609}"/>
               </a:ext>
             </a:extLst>
           </p:cNvPr>
@@ -5097,82 +5160,38 @@
           <a:p>
             <a:r>
               <a:rPr lang="en-GB" dirty="0"/>
-              <a:t>Step1 – make a weather component in your ex1 application</a:t>
-            </a:r>
+              <a:t>Changes in </a:t>
+            </a:r>
+            <a:r>
+              <a:rPr lang="en-GB" dirty="0" err="1"/>
+              <a:t>app.component.ts</a:t>
+            </a:r>
+            <a:endParaRPr lang="en-GB" dirty="0"/>
           </a:p>
           <a:p>
             <a:pPr lvl="1"/>
-            <a:r>
-              <a:rPr lang="en-GB" dirty="0"/>
-              <a:t>In your ex1</a:t>
-            </a:r>
+            <a:endParaRPr lang="en-GB" dirty="0"/>
           </a:p>
           <a:p>
             <a:pPr lvl="1"/>
             <a:r>
               <a:rPr lang="en-GB" dirty="0"/>
-              <a:t>ng g c weather // ng </a:t>
-            </a:r>
-            <a:r>
-              <a:rPr lang="en-GB" i="1" dirty="0"/>
-              <a:t>generate component </a:t>
-            </a:r>
-            <a:r>
-              <a:rPr lang="en-GB" dirty="0"/>
-              <a:t>weather</a:t>
+              <a:t>Try it,  change title property, add a property and add it as {{}} in the HTML</a:t>
             </a:r>
           </a:p>
           <a:p>
             <a:pPr lvl="1"/>
             <a:r>
-              <a:rPr lang="en-GB" dirty="0"/>
-              <a:t>Put weather component on app.component.html</a:t>
-            </a:r>
+              <a:rPr lang="en-GB" dirty="0">
+                <a:hlinkClick r:id="rId2"/>
+              </a:rPr>
+              <a:t>https://www.udemy.com/the-complete-guide-to-angular-2/learn/v4/t/lecture/6655704?start=0</a:t>
+            </a:r>
+            <a:endParaRPr lang="en-GB" dirty="0"/>
           </a:p>
           <a:p>
             <a:pPr lvl="1"/>
-            <a:r>
-              <a:rPr lang="en-GB" dirty="0"/>
-              <a:t>Using </a:t>
-            </a:r>
-            <a:r>
-              <a:rPr lang="en-GB" dirty="0" err="1"/>
-              <a:t>openweather</a:t>
-            </a:r>
-            <a:r>
-              <a:rPr lang="en-GB" dirty="0"/>
-              <a:t> API to get data</a:t>
-            </a:r>
-          </a:p>
-          <a:p>
-            <a:pPr lvl="1"/>
-            <a:r>
-              <a:rPr lang="en-GB" dirty="0"/>
-              <a:t>Using </a:t>
-            </a:r>
-            <a:r>
-              <a:rPr lang="en-GB" dirty="0" err="1"/>
-              <a:t>httpClient</a:t>
-            </a:r>
-            <a:r>
-              <a:rPr lang="en-GB" dirty="0"/>
-              <a:t>  // add in module and component</a:t>
-            </a:r>
-          </a:p>
-          <a:p>
-            <a:pPr lvl="1"/>
-            <a:r>
-              <a:rPr lang="en-GB" dirty="0"/>
-              <a:t>Show </a:t>
-            </a:r>
-            <a:r>
-              <a:rPr lang="en-GB" dirty="0" err="1"/>
-              <a:t>json</a:t>
-            </a:r>
-            <a:r>
-              <a:rPr lang="en-GB" dirty="0"/>
-              <a:t> on HTML</a:t>
-            </a:r>
+            <a:endParaRPr lang="en-GB" dirty="0"/>
           </a:p>
           <a:p>
             <a:endParaRPr lang="en-GB" dirty="0"/>
@@ -5184,7 +5203,7 @@
           <p:cNvPr id="3" name="Title 2">
             <a:extLst>
               <a:ext uri="{FF2B5EF4-FFF2-40B4-BE49-F238E27FC236}">
-                <a16:creationId xmlns:a16="http://schemas.microsoft.com/office/drawing/2014/main" id="{515E7607-A581-4816-BA37-45A19DE5CC99}"/>
+                <a16:creationId xmlns:a16="http://schemas.microsoft.com/office/drawing/2014/main" id="{B436C8DD-B0D4-45A6-9941-CE0474D20E49}"/>
               </a:ext>
             </a:extLst>
           </p:cNvPr>
@@ -5202,7 +5221,7 @@
           <a:p>
             <a:r>
               <a:rPr lang="en-GB" dirty="0"/>
-              <a:t>Making a weather component</a:t>
+              <a:t>ex2 - First App</a:t>
             </a:r>
           </a:p>
         </p:txBody>
@@ -5210,7 +5229,7 @@
     </p:spTree>
     <p:extLst>
       <p:ext uri="{BB962C8B-B14F-4D97-AF65-F5344CB8AC3E}">
-        <p14:creationId xmlns:p14="http://schemas.microsoft.com/office/powerpoint/2010/main" val="3101075385"/>
+        <p14:creationId xmlns:p14="http://schemas.microsoft.com/office/powerpoint/2010/main" val="2789295655"/>
       </p:ext>
     </p:extLst>
   </p:cSld>
@@ -5255,41 +5274,78 @@
         </p:nvSpPr>
         <p:spPr/>
         <p:txBody>
-          <a:bodyPr>
-            <a:normAutofit fontScale="92500" lnSpcReduction="20000"/>
-          </a:bodyPr>
+          <a:bodyPr/>
           <a:lstStyle/>
           <a:p>
             <a:r>
               <a:rPr lang="en-GB" dirty="0"/>
-              <a:t>Step2 – listing the data</a:t>
+              <a:t>Step1 – make a weather component in your ex1 application</a:t>
             </a:r>
           </a:p>
           <a:p>
             <a:pPr lvl="1"/>
             <a:r>
               <a:rPr lang="en-GB" dirty="0"/>
-              <a:t>Use *</a:t>
+              <a:t>In your ex1</a:t>
+            </a:r>
+          </a:p>
+          <a:p>
+            <a:pPr lvl="1"/>
+            <a:r>
+              <a:rPr lang="en-GB" dirty="0"/>
+              <a:t>ng g c weather // ng </a:t>
+            </a:r>
+            <a:r>
+              <a:rPr lang="en-GB" i="1" dirty="0"/>
+              <a:t>generate component </a:t>
+            </a:r>
+            <a:r>
+              <a:rPr lang="en-GB" dirty="0"/>
+              <a:t>weather</a:t>
+            </a:r>
+          </a:p>
+          <a:p>
+            <a:pPr lvl="1"/>
+            <a:r>
+              <a:rPr lang="en-GB" dirty="0"/>
+              <a:t>Put weather component on app.component.html</a:t>
+            </a:r>
+          </a:p>
+          <a:p>
+            <a:pPr lvl="1"/>
+            <a:r>
+              <a:rPr lang="en-GB" dirty="0"/>
+              <a:t>Using </a:t>
             </a:r>
             <a:r>
               <a:rPr lang="en-GB" dirty="0" err="1"/>
-              <a:t>ngFor</a:t>
-            </a:r>
-            <a:r>
-              <a:rPr lang="en-GB" dirty="0"/>
-              <a:t> // *</a:t>
+              <a:t>openweather</a:t>
+            </a:r>
+            <a:r>
+              <a:rPr lang="en-GB" dirty="0"/>
+              <a:t> API to get data</a:t>
+            </a:r>
+          </a:p>
+          <a:p>
+            <a:pPr lvl="1"/>
+            <a:r>
+              <a:rPr lang="en-GB" dirty="0"/>
+              <a:t>Using </a:t>
             </a:r>
             <a:r>
               <a:rPr lang="en-GB" dirty="0" err="1"/>
-              <a:t>ngIf</a:t>
-            </a:r>
-            <a:endParaRPr lang="en-GB" dirty="0"/>
+              <a:t>httpClient</a:t>
+            </a:r>
+            <a:r>
+              <a:rPr lang="en-GB" dirty="0"/>
+              <a:t>  // add in module and component</a:t>
+            </a:r>
           </a:p>
           <a:p>
             <a:pPr lvl="1"/>
             <a:r>
               <a:rPr lang="en-GB" dirty="0"/>
-              <a:t>Display </a:t>
+              <a:t>Show </a:t>
             </a:r>
             <a:r>
               <a:rPr lang="en-GB" dirty="0" err="1"/>
@@ -5297,103 +5353,10 @@
             </a:r>
             <a:r>
               <a:rPr lang="en-GB" dirty="0"/>
-              <a:t> on html {{</a:t>
-            </a:r>
-            <a:r>
-              <a:rPr lang="en-GB" dirty="0" err="1"/>
-              <a:t>weatherInfo</a:t>
-            </a:r>
-            <a:r>
-              <a:rPr lang="en-GB" dirty="0"/>
-              <a:t> | </a:t>
-            </a:r>
-            <a:r>
-              <a:rPr lang="en-GB" dirty="0" err="1"/>
-              <a:t>json</a:t>
-            </a:r>
-            <a:r>
-              <a:rPr lang="en-GB" dirty="0"/>
-              <a:t>)</a:t>
-            </a:r>
-          </a:p>
-          <a:p>
-            <a:pPr lvl="1"/>
-            <a:r>
-              <a:rPr lang="en-GB" dirty="0"/>
-              <a:t>Dynamically build a table</a:t>
-            </a:r>
-          </a:p>
-          <a:p>
-            <a:endParaRPr lang="en-GB" dirty="0"/>
-          </a:p>
-          <a:p>
-            <a:r>
-              <a:rPr lang="en-GB" dirty="0"/>
-              <a:t>Step 3 – Making in pretty</a:t>
-            </a:r>
-          </a:p>
-          <a:p>
-            <a:pPr lvl="1"/>
-            <a:r>
-              <a:rPr lang="en-GB" dirty="0"/>
-              <a:t>Angular materials</a:t>
-            </a:r>
-          </a:p>
-          <a:p>
-            <a:pPr lvl="2"/>
-            <a:r>
-              <a:rPr lang="en-GB" dirty="0">
-                <a:hlinkClick r:id="rId2"/>
-              </a:rPr>
-              <a:t>https://material.angular.io/guide/getting-started</a:t>
-            </a:r>
-            <a:endParaRPr lang="en-GB" dirty="0"/>
-          </a:p>
-          <a:p>
-            <a:pPr lvl="2"/>
-            <a:r>
-              <a:rPr lang="en-GB" dirty="0" err="1"/>
-              <a:t>npm</a:t>
-            </a:r>
-            <a:r>
-              <a:rPr lang="en-GB" dirty="0"/>
-              <a:t> install --save angular/material2-builds angular/</a:t>
-            </a:r>
-            <a:r>
-              <a:rPr lang="en-GB" dirty="0" err="1"/>
-              <a:t>cdk</a:t>
-            </a:r>
-            <a:r>
-              <a:rPr lang="en-GB" dirty="0"/>
-              <a:t>-builds angular/animations-builds</a:t>
-            </a:r>
-          </a:p>
-          <a:p>
-            <a:pPr lvl="2"/>
-            <a:r>
-              <a:rPr lang="en-GB" dirty="0"/>
-              <a:t>ng add @angular/material</a:t>
-            </a:r>
-          </a:p>
-          <a:p>
-            <a:pPr lvl="2"/>
-            <a:r>
-              <a:rPr lang="en-GB" dirty="0"/>
-              <a:t>Syle.css – first line</a:t>
-            </a:r>
-          </a:p>
-          <a:p>
-            <a:pPr lvl="3"/>
-            <a:r>
-              <a:rPr lang="en-GB" dirty="0"/>
-              <a:t>@import "~@angular/material/prebuilt-themes/indigo-pink.css";</a:t>
-            </a:r>
-          </a:p>
-          <a:p>
-            <a:endParaRPr lang="en-GB" dirty="0"/>
-          </a:p>
-          <a:p>
-            <a:pPr lvl="1"/>
+              <a:t> on HTML</a:t>
+            </a:r>
+          </a:p>
+          <a:p>
             <a:endParaRPr lang="en-GB" dirty="0"/>
           </a:p>
         </p:txBody>
@@ -5429,7 +5392,7 @@
     </p:spTree>
     <p:extLst>
       <p:ext uri="{BB962C8B-B14F-4D97-AF65-F5344CB8AC3E}">
-        <p14:creationId xmlns:p14="http://schemas.microsoft.com/office/powerpoint/2010/main" val="3725672559"/>
+        <p14:creationId xmlns:p14="http://schemas.microsoft.com/office/powerpoint/2010/main" val="3101075385"/>
       </p:ext>
     </p:extLst>
   </p:cSld>
@@ -5474,101 +5437,142 @@
         </p:nvSpPr>
         <p:spPr/>
         <p:txBody>
-          <a:bodyPr/>
+          <a:bodyPr>
+            <a:normAutofit fontScale="92500" lnSpcReduction="20000"/>
+          </a:bodyPr>
           <a:lstStyle/>
           <a:p>
             <a:r>
               <a:rPr lang="en-GB" dirty="0"/>
-              <a:t>Step4 – Adding charts</a:t>
+              <a:t>Step2 – listing the data</a:t>
             </a:r>
           </a:p>
           <a:p>
             <a:pPr lvl="1"/>
             <a:r>
               <a:rPr lang="en-GB" dirty="0"/>
-              <a:t>https://www.npmjs.com/package/@swimlane/ngx-charts</a:t>
-            </a:r>
+              <a:t>Use *</a:t>
+            </a:r>
+            <a:r>
+              <a:rPr lang="en-GB" dirty="0" err="1"/>
+              <a:t>ngFor</a:t>
+            </a:r>
+            <a:r>
+              <a:rPr lang="en-GB" dirty="0"/>
+              <a:t> // *</a:t>
+            </a:r>
+            <a:r>
+              <a:rPr lang="en-GB" dirty="0" err="1"/>
+              <a:t>ngIf</a:t>
+            </a:r>
+            <a:endParaRPr lang="en-GB" dirty="0"/>
           </a:p>
           <a:p>
             <a:pPr lvl="1"/>
+            <a:r>
+              <a:rPr lang="en-GB" dirty="0"/>
+              <a:t>Display </a:t>
+            </a:r>
+            <a:r>
+              <a:rPr lang="en-GB" dirty="0" err="1"/>
+              <a:t>json</a:t>
+            </a:r>
+            <a:r>
+              <a:rPr lang="en-GB" dirty="0"/>
+              <a:t> on html {{</a:t>
+            </a:r>
+            <a:r>
+              <a:rPr lang="en-GB" dirty="0" err="1"/>
+              <a:t>weatherInfo</a:t>
+            </a:r>
+            <a:r>
+              <a:rPr lang="en-GB" dirty="0"/>
+              <a:t> | </a:t>
+            </a:r>
+            <a:r>
+              <a:rPr lang="en-GB" dirty="0" err="1"/>
+              <a:t>json</a:t>
+            </a:r>
+            <a:r>
+              <a:rPr lang="en-GB" dirty="0"/>
+              <a:t>)</a:t>
+            </a:r>
+          </a:p>
+          <a:p>
+            <a:pPr lvl="1"/>
+            <a:r>
+              <a:rPr lang="en-GB" dirty="0"/>
+              <a:t>Dynamically build a table</a:t>
+            </a:r>
+          </a:p>
+          <a:p>
+            <a:endParaRPr lang="en-GB" dirty="0"/>
+          </a:p>
+          <a:p>
+            <a:r>
+              <a:rPr lang="en-GB" dirty="0"/>
+              <a:t>Step 3 – Making in pretty</a:t>
+            </a:r>
+          </a:p>
+          <a:p>
+            <a:pPr lvl="1"/>
+            <a:r>
+              <a:rPr lang="en-GB" dirty="0"/>
+              <a:t>Angular materials</a:t>
+            </a:r>
+          </a:p>
+          <a:p>
+            <a:pPr lvl="2"/>
+            <a:r>
+              <a:rPr lang="en-GB" dirty="0">
+                <a:hlinkClick r:id="rId2"/>
+              </a:rPr>
+              <a:t>https://material.angular.io/guide/getting-started</a:t>
+            </a:r>
+            <a:endParaRPr lang="en-GB" dirty="0"/>
+          </a:p>
+          <a:p>
+            <a:pPr lvl="2"/>
             <a:r>
               <a:rPr lang="en-GB" dirty="0" err="1"/>
               <a:t>npm</a:t>
             </a:r>
             <a:r>
               <a:rPr lang="en-GB" dirty="0"/>
-              <a:t> </a:t>
+              <a:t> install --save angular/material2-builds angular/</a:t>
             </a:r>
             <a:r>
               <a:rPr lang="en-GB" dirty="0" err="1"/>
-              <a:t>i</a:t>
-            </a:r>
-            <a:r>
-              <a:rPr lang="en-GB" dirty="0"/>
-              <a:t> @</a:t>
-            </a:r>
-            <a:r>
-              <a:rPr lang="en-GB" dirty="0" err="1"/>
-              <a:t>swimlane</a:t>
-            </a:r>
-            <a:r>
-              <a:rPr lang="en-GB" dirty="0"/>
-              <a:t>/</a:t>
-            </a:r>
-            <a:r>
-              <a:rPr lang="en-GB" dirty="0" err="1"/>
-              <a:t>ngx</a:t>
-            </a:r>
-            <a:r>
-              <a:rPr lang="en-GB" dirty="0"/>
-              <a:t>-charts –save</a:t>
-            </a:r>
-          </a:p>
-          <a:p>
-            <a:pPr lvl="1"/>
-            <a:r>
-              <a:rPr lang="en-GB" dirty="0"/>
-              <a:t>import { Component } from '@angular/core’;</a:t>
-            </a:r>
-          </a:p>
-          <a:p>
-            <a:pPr lvl="1"/>
-            <a:r>
-              <a:rPr lang="en-GB" dirty="0"/>
-              <a:t>In </a:t>
-            </a:r>
-            <a:r>
-              <a:rPr lang="en-GB" dirty="0" err="1"/>
-              <a:t>app.module.ts</a:t>
-            </a:r>
-            <a:r>
-              <a:rPr lang="en-GB" dirty="0"/>
-              <a:t> import { </a:t>
-            </a:r>
-            <a:r>
-              <a:rPr lang="en-GB" dirty="0" err="1"/>
-              <a:t>NgxChartsModule</a:t>
-            </a:r>
-            <a:r>
-              <a:rPr lang="en-GB" dirty="0"/>
-              <a:t> } from '@</a:t>
-            </a:r>
-            <a:r>
-              <a:rPr lang="en-GB" dirty="0" err="1"/>
-              <a:t>swimlane</a:t>
-            </a:r>
-            <a:r>
-              <a:rPr lang="en-GB" dirty="0"/>
-              <a:t>/</a:t>
-            </a:r>
-            <a:r>
-              <a:rPr lang="en-GB" dirty="0" err="1"/>
-              <a:t>ngx</a:t>
-            </a:r>
-            <a:r>
-              <a:rPr lang="en-GB" dirty="0"/>
-              <a:t>-charts';</a:t>
-            </a:r>
+              <a:t>cdk</a:t>
+            </a:r>
+            <a:r>
+              <a:rPr lang="en-GB" dirty="0"/>
+              <a:t>-builds angular/animations-builds</a:t>
+            </a:r>
+          </a:p>
+          <a:p>
+            <a:pPr lvl="2"/>
+            <a:r>
+              <a:rPr lang="en-GB" dirty="0"/>
+              <a:t>ng add @angular/material</a:t>
+            </a:r>
+          </a:p>
+          <a:p>
+            <a:pPr lvl="2"/>
+            <a:r>
+              <a:rPr lang="en-GB" dirty="0"/>
+              <a:t>Syle.css – first line</a:t>
+            </a:r>
+          </a:p>
+          <a:p>
+            <a:pPr lvl="3"/>
+            <a:r>
+              <a:rPr lang="en-GB" dirty="0"/>
+              <a:t>@import "~@angular/material/prebuilt-themes/indigo-pink.css";</a:t>
+            </a:r>
+          </a:p>
+          <a:p>
+            <a:endParaRPr lang="en-GB" dirty="0"/>
           </a:p>
           <a:p>
             <a:pPr lvl="1"/>
@@ -5607,7 +5611,7 @@
     </p:spTree>
     <p:extLst>
       <p:ext uri="{BB962C8B-B14F-4D97-AF65-F5344CB8AC3E}">
-        <p14:creationId xmlns:p14="http://schemas.microsoft.com/office/powerpoint/2010/main" val="1444711163"/>
+        <p14:creationId xmlns:p14="http://schemas.microsoft.com/office/powerpoint/2010/main" val="3725672559"/>
       </p:ext>
     </p:extLst>
   </p:cSld>
@@ -5657,58 +5661,96 @@
           <a:p>
             <a:r>
               <a:rPr lang="en-GB" dirty="0"/>
-              <a:t>Step5 – Making responsive</a:t>
+              <a:t>Step4 – Adding charts</a:t>
             </a:r>
           </a:p>
           <a:p>
             <a:pPr lvl="1"/>
             <a:r>
               <a:rPr lang="en-GB" dirty="0"/>
-              <a:t>Module: </a:t>
-            </a:r>
-            <a:r>
-              <a:rPr lang="nb-NO" dirty="0"/>
-              <a:t>npm install @angular/flex-layout @angular/cdk</a:t>
+              <a:t>https://www.npmjs.com/package/@swimlane/ngx-charts</a:t>
             </a:r>
           </a:p>
           <a:p>
             <a:pPr lvl="1"/>
             <a:r>
-              <a:rPr lang="en-GB" dirty="0"/>
-              <a:t>import { </a:t>
-            </a:r>
-            <a:r>
               <a:rPr lang="en-GB" dirty="0" err="1"/>
-              <a:t>FlexLayoutModule</a:t>
-            </a:r>
-            <a:r>
-              <a:rPr lang="en-GB" dirty="0"/>
-              <a:t> } from "@angular/flex-layout";</a:t>
+              <a:t>npm</a:t>
+            </a:r>
+            <a:r>
+              <a:rPr lang="en-GB" dirty="0"/>
+              <a:t> </a:t>
+            </a:r>
+            <a:r>
+              <a:rPr lang="en-GB" dirty="0" err="1"/>
+              <a:t>i</a:t>
+            </a:r>
+            <a:r>
+              <a:rPr lang="en-GB" dirty="0"/>
+              <a:t> @</a:t>
+            </a:r>
+            <a:r>
+              <a:rPr lang="en-GB" dirty="0" err="1"/>
+              <a:t>swimlane</a:t>
+            </a:r>
+            <a:r>
+              <a:rPr lang="en-GB" dirty="0"/>
+              <a:t>/</a:t>
+            </a:r>
+            <a:r>
+              <a:rPr lang="en-GB" dirty="0" err="1"/>
+              <a:t>ngx</a:t>
+            </a:r>
+            <a:r>
+              <a:rPr lang="en-GB" dirty="0"/>
+              <a:t>-charts –save</a:t>
             </a:r>
           </a:p>
           <a:p>
             <a:pPr lvl="1"/>
             <a:r>
-              <a:rPr lang="en-GB" dirty="0">
-                <a:hlinkClick r:id="rId2"/>
-              </a:rPr>
-              <a:t>https://tburleson-layouts-demos.firebaseapp.com/#/docs</a:t>
-            </a:r>
-            <a:endParaRPr lang="en-GB" dirty="0"/>
+              <a:rPr lang="en-GB" dirty="0"/>
+              <a:t>import { Component } from '@angular/core’;</a:t>
+            </a:r>
           </a:p>
           <a:p>
             <a:pPr lvl="1"/>
             <a:r>
-              <a:rPr lang="en-GB" dirty="0">
-                <a:hlinkClick r:id="rId3"/>
-              </a:rPr>
-              <a:t>https://github.com/angular/flex-layout/wiki/Responsive-API</a:t>
-            </a:r>
-            <a:endParaRPr lang="en-GB" dirty="0"/>
-          </a:p>
-          <a:p>
-            <a:pPr lvl="1"/>
-            <a:endParaRPr lang="en-GB" dirty="0"/>
+              <a:rPr lang="en-GB" dirty="0"/>
+              <a:t>In </a:t>
+            </a:r>
+            <a:r>
+              <a:rPr lang="en-GB" dirty="0" err="1"/>
+              <a:t>app.module.ts</a:t>
+            </a:r>
+            <a:r>
+              <a:rPr lang="en-GB" dirty="0"/>
+              <a:t> import { </a:t>
+            </a:r>
+            <a:r>
+              <a:rPr lang="en-GB" dirty="0" err="1"/>
+              <a:t>NgxChartsModule</a:t>
+            </a:r>
+            <a:r>
+              <a:rPr lang="en-GB" dirty="0"/>
+              <a:t> } from '@</a:t>
+            </a:r>
+            <a:r>
+              <a:rPr lang="en-GB" dirty="0" err="1"/>
+              <a:t>swimlane</a:t>
+            </a:r>
+            <a:r>
+              <a:rPr lang="en-GB" dirty="0"/>
+              <a:t>/</a:t>
+            </a:r>
+            <a:r>
+              <a:rPr lang="en-GB" dirty="0" err="1"/>
+              <a:t>ngx</a:t>
+            </a:r>
+            <a:r>
+              <a:rPr lang="en-GB" dirty="0"/>
+              <a:t>-charts';</a:t>
+            </a:r>
           </a:p>
           <a:p>
             <a:pPr lvl="1"/>
@@ -5747,7 +5789,7 @@
     </p:spTree>
     <p:extLst>
       <p:ext uri="{BB962C8B-B14F-4D97-AF65-F5344CB8AC3E}">
-        <p14:creationId xmlns:p14="http://schemas.microsoft.com/office/powerpoint/2010/main" val="1955803153"/>
+        <p14:creationId xmlns:p14="http://schemas.microsoft.com/office/powerpoint/2010/main" val="1444711163"/>
       </p:ext>
     </p:extLst>
   </p:cSld>
@@ -5797,23 +5839,58 @@
           <a:p>
             <a:r>
               <a:rPr lang="en-GB" dirty="0"/>
-              <a:t>Step6 – Forms – select your city</a:t>
+              <a:t>Step5 – Making responsive</a:t>
             </a:r>
           </a:p>
           <a:p>
             <a:pPr lvl="1"/>
             <a:r>
               <a:rPr lang="en-GB" dirty="0"/>
-              <a:t>import {</a:t>
+              <a:t>Module: </a:t>
+            </a:r>
+            <a:r>
+              <a:rPr lang="nb-NO" dirty="0"/>
+              <a:t>npm install @angular/flex-layout @angular/cdk</a:t>
+            </a:r>
+          </a:p>
+          <a:p>
+            <a:pPr lvl="1"/>
+            <a:r>
+              <a:rPr lang="en-GB" dirty="0"/>
+              <a:t>import { </a:t>
             </a:r>
             <a:r>
               <a:rPr lang="en-GB" dirty="0" err="1"/>
-              <a:t>FormsModule</a:t>
-            </a:r>
-            <a:r>
-              <a:rPr lang="en-GB" dirty="0"/>
-              <a:t>} from "@angular/forms";</a:t>
-            </a:r>
+              <a:t>FlexLayoutModule</a:t>
+            </a:r>
+            <a:r>
+              <a:rPr lang="en-GB" dirty="0"/>
+              <a:t> } from "@angular/flex-layout";</a:t>
+            </a:r>
+          </a:p>
+          <a:p>
+            <a:pPr lvl="1"/>
+            <a:r>
+              <a:rPr lang="en-GB" dirty="0">
+                <a:hlinkClick r:id="rId2"/>
+              </a:rPr>
+              <a:t>https://tburleson-layouts-demos.firebaseapp.com/#/docs</a:t>
+            </a:r>
+            <a:endParaRPr lang="en-GB" dirty="0"/>
+          </a:p>
+          <a:p>
+            <a:pPr lvl="1"/>
+            <a:r>
+              <a:rPr lang="en-GB" dirty="0">
+                <a:hlinkClick r:id="rId3"/>
+              </a:rPr>
+              <a:t>https://github.com/angular/flex-layout/wiki/Responsive-API</a:t>
+            </a:r>
+            <a:endParaRPr lang="en-GB" dirty="0"/>
+          </a:p>
+          <a:p>
+            <a:pPr lvl="1"/>
+            <a:endParaRPr lang="en-GB" dirty="0"/>
           </a:p>
           <a:p>
             <a:pPr lvl="1"/>
@@ -5852,7 +5929,7 @@
     </p:spTree>
     <p:extLst>
       <p:ext uri="{BB962C8B-B14F-4D97-AF65-F5344CB8AC3E}">
-        <p14:creationId xmlns:p14="http://schemas.microsoft.com/office/powerpoint/2010/main" val="3647627247"/>
+        <p14:creationId xmlns:p14="http://schemas.microsoft.com/office/powerpoint/2010/main" val="1955803153"/>
       </p:ext>
     </p:extLst>
   </p:cSld>
@@ -5884,7 +5961,7 @@
           <p:cNvPr id="2" name="Content Placeholder 1">
             <a:extLst>
               <a:ext uri="{FF2B5EF4-FFF2-40B4-BE49-F238E27FC236}">
-                <a16:creationId xmlns:a16="http://schemas.microsoft.com/office/drawing/2014/main" id="{9841A130-9CDD-4DB0-99FF-4FFF00567844}"/>
+                <a16:creationId xmlns:a16="http://schemas.microsoft.com/office/drawing/2014/main" id="{7E953881-B8E2-49B6-9BD9-62181672C39A}"/>
               </a:ext>
             </a:extLst>
           </p:cNvPr>
@@ -5902,83 +5979,26 @@
           <a:p>
             <a:r>
               <a:rPr lang="en-GB" dirty="0"/>
-              <a:t>PWA </a:t>
+              <a:t>Step6 – Forms – select your city</a:t>
             </a:r>
           </a:p>
           <a:p>
             <a:pPr lvl="1"/>
             <a:r>
               <a:rPr lang="en-GB" dirty="0"/>
-              <a:t>ng add @angular/</a:t>
+              <a:t>import {</a:t>
             </a:r>
             <a:r>
               <a:rPr lang="en-GB" dirty="0" err="1"/>
-              <a:t>pwa</a:t>
-            </a:r>
-            <a:endParaRPr lang="en-GB" dirty="0"/>
-          </a:p>
-          <a:p>
-            <a:r>
-              <a:rPr lang="en-GB" dirty="0"/>
-              <a:t>Building</a:t>
+              <a:t>FormsModule</a:t>
+            </a:r>
+            <a:r>
+              <a:rPr lang="en-GB" dirty="0"/>
+              <a:t>} from "@angular/forms";</a:t>
             </a:r>
           </a:p>
           <a:p>
             <a:pPr lvl="1"/>
-            <a:r>
-              <a:rPr lang="en-GB" dirty="0"/>
-              <a:t>ng build –prod</a:t>
-            </a:r>
-          </a:p>
-          <a:p>
-            <a:pPr lvl="1"/>
-            <a:r>
-              <a:rPr lang="en-GB" dirty="0"/>
-              <a:t>cd </a:t>
-            </a:r>
-            <a:r>
-              <a:rPr lang="en-GB" dirty="0" err="1"/>
-              <a:t>dist</a:t>
-            </a:r>
-            <a:r>
-              <a:rPr lang="en-GB" dirty="0"/>
-              <a:t>\ex3</a:t>
-            </a:r>
-          </a:p>
-          <a:p>
-            <a:pPr lvl="1"/>
-            <a:r>
-              <a:rPr lang="en-GB" dirty="0"/>
-              <a:t>http-server (run a simple server) (google </a:t>
-            </a:r>
-            <a:r>
-              <a:rPr lang="en-GB" dirty="0" err="1"/>
-              <a:t>npm</a:t>
-            </a:r>
-            <a:r>
-              <a:rPr lang="en-GB" dirty="0"/>
-              <a:t> http-server)</a:t>
-            </a:r>
-          </a:p>
-          <a:p>
-            <a:pPr lvl="1"/>
-            <a:r>
-              <a:rPr lang="en-GB" dirty="0"/>
-              <a:t>Surf your app </a:t>
-            </a:r>
-            <a:r>
-              <a:rPr lang="en-GB" dirty="0">
-                <a:hlinkClick r:id="rId2"/>
-              </a:rPr>
-              <a:t>http://localhost:8080</a:t>
-            </a:r>
-            <a:endParaRPr lang="en-GB" dirty="0"/>
-          </a:p>
-          <a:p>
-            <a:pPr lvl="1"/>
-            <a:endParaRPr lang="en-GB" dirty="0"/>
-          </a:p>
-          <a:p>
             <a:endParaRPr lang="en-GB" dirty="0"/>
           </a:p>
         </p:txBody>
@@ -5988,7 +6008,7 @@
           <p:cNvPr id="3" name="Title 2">
             <a:extLst>
               <a:ext uri="{FF2B5EF4-FFF2-40B4-BE49-F238E27FC236}">
-                <a16:creationId xmlns:a16="http://schemas.microsoft.com/office/drawing/2014/main" id="{208B175A-03BE-433A-82D8-5CF799A69DF7}"/>
+                <a16:creationId xmlns:a16="http://schemas.microsoft.com/office/drawing/2014/main" id="{515E7607-A581-4816-BA37-45A19DE5CC99}"/>
               </a:ext>
             </a:extLst>
           </p:cNvPr>
@@ -6006,7 +6026,7 @@
           <a:p>
             <a:r>
               <a:rPr lang="en-GB" dirty="0"/>
-              <a:t>Build the App</a:t>
+              <a:t>Making a weather component</a:t>
             </a:r>
           </a:p>
         </p:txBody>
@@ -6014,7 +6034,7 @@
     </p:spTree>
     <p:extLst>
       <p:ext uri="{BB962C8B-B14F-4D97-AF65-F5344CB8AC3E}">
-        <p14:creationId xmlns:p14="http://schemas.microsoft.com/office/powerpoint/2010/main" val="1777565904"/>
+        <p14:creationId xmlns:p14="http://schemas.microsoft.com/office/powerpoint/2010/main" val="3647627247"/>
       </p:ext>
     </p:extLst>
   </p:cSld>
@@ -6046,7 +6066,7 @@
           <p:cNvPr id="2" name="Content Placeholder 1">
             <a:extLst>
               <a:ext uri="{FF2B5EF4-FFF2-40B4-BE49-F238E27FC236}">
-                <a16:creationId xmlns:a16="http://schemas.microsoft.com/office/drawing/2014/main" id="{09CB529D-071A-4CCF-8ED5-D1AA535AC3D8}"/>
+                <a16:creationId xmlns:a16="http://schemas.microsoft.com/office/drawing/2014/main" id="{9841A130-9CDD-4DB0-99FF-4FFF00567844}"/>
               </a:ext>
             </a:extLst>
           </p:cNvPr>
@@ -6064,80 +6084,75 @@
           <a:p>
             <a:r>
               <a:rPr lang="en-GB" dirty="0"/>
-              <a:t>Resources</a:t>
+              <a:t>PWA </a:t>
             </a:r>
           </a:p>
           <a:p>
             <a:pPr lvl="1"/>
             <a:r>
               <a:rPr lang="en-GB" dirty="0"/>
-              <a:t>FLEX</a:t>
+              <a:t>ng add @angular/</a:t>
+            </a:r>
+            <a:r>
+              <a:rPr lang="en-GB" dirty="0" err="1"/>
+              <a:t>pwa</a:t>
+            </a:r>
+            <a:endParaRPr lang="en-GB" dirty="0"/>
+          </a:p>
+          <a:p>
+            <a:r>
+              <a:rPr lang="en-GB" dirty="0"/>
+              <a:t>Building</a:t>
             </a:r>
           </a:p>
           <a:p>
             <a:pPr lvl="1"/>
+            <a:r>
+              <a:rPr lang="en-GB" dirty="0"/>
+              <a:t>ng build –prod</a:t>
+            </a:r>
+          </a:p>
+          <a:p>
+            <a:pPr lvl="1"/>
+            <a:r>
+              <a:rPr lang="en-GB" dirty="0"/>
+              <a:t>cd </a:t>
+            </a:r>
+            <a:r>
+              <a:rPr lang="en-GB" dirty="0" err="1"/>
+              <a:t>dist</a:t>
+            </a:r>
+            <a:r>
+              <a:rPr lang="en-GB" dirty="0"/>
+              <a:t>\ex3</a:t>
+            </a:r>
+          </a:p>
+          <a:p>
+            <a:pPr lvl="1"/>
+            <a:r>
+              <a:rPr lang="en-GB" dirty="0"/>
+              <a:t>http-server (run a simple server) (google </a:t>
+            </a:r>
+            <a:r>
+              <a:rPr lang="en-GB" dirty="0" err="1"/>
+              <a:t>npm</a:t>
+            </a:r>
+            <a:r>
+              <a:rPr lang="en-GB" dirty="0"/>
+              <a:t> http-server)</a:t>
+            </a:r>
+          </a:p>
+          <a:p>
+            <a:pPr lvl="1"/>
+            <a:r>
+              <a:rPr lang="en-GB" dirty="0"/>
+              <a:t>Surf your app </a:t>
+            </a:r>
             <a:r>
               <a:rPr lang="en-GB" dirty="0">
                 <a:hlinkClick r:id="rId2"/>
               </a:rPr>
-              <a:t>https://tburleson-layouts-demos.firebaseapp.com/#/docs</a:t>
-            </a:r>
-            <a:endParaRPr lang="en-GB" dirty="0"/>
-          </a:p>
-          <a:p>
-            <a:pPr lvl="1"/>
-            <a:r>
-              <a:rPr lang="en-GB" dirty="0">
-                <a:hlinkClick r:id="rId3"/>
-              </a:rPr>
-              <a:t>https://blog.angularindepth.com/angular-flex-layout-flexbox-and-grid-layout-for-angular-component-6e7c24457b63</a:t>
-            </a:r>
-            <a:endParaRPr lang="en-GB" dirty="0"/>
-          </a:p>
-          <a:p>
-            <a:pPr lvl="1"/>
-            <a:r>
-              <a:rPr lang="en-GB" dirty="0">
-                <a:hlinkClick r:id="rId4"/>
-              </a:rPr>
-              <a:t>https://github.com/angular/flex-layout/wiki/fxFlex-API</a:t>
-            </a:r>
-            <a:endParaRPr lang="en-GB" dirty="0"/>
-          </a:p>
-          <a:p>
-            <a:pPr lvl="1"/>
-            <a:r>
-              <a:rPr lang="en-GB" dirty="0"/>
-              <a:t>NGX-CHARTS</a:t>
-            </a:r>
-          </a:p>
-          <a:p>
-            <a:pPr lvl="1"/>
-            <a:r>
-              <a:rPr lang="en-GB" dirty="0">
-                <a:hlinkClick r:id="rId5"/>
-              </a:rPr>
-              <a:t>https://swimlane.gitbook.io/ngx-charts/</a:t>
-            </a:r>
-            <a:endParaRPr lang="en-GB" dirty="0"/>
-          </a:p>
-          <a:p>
-            <a:pPr lvl="1"/>
-            <a:r>
-              <a:rPr lang="en-GB" dirty="0">
-                <a:hlinkClick r:id="rId6"/>
-              </a:rPr>
-              <a:t>https://medium.com/@robertokedmenec/angular-2-with-ngx-charts-464efb9a2d5</a:t>
-            </a:r>
-            <a:endParaRPr lang="en-GB" dirty="0"/>
-          </a:p>
-          <a:p>
-            <a:pPr lvl="1"/>
-            <a:r>
-              <a:rPr lang="en-GB" dirty="0">
-                <a:hlinkClick r:id="rId7"/>
-              </a:rPr>
-              <a:t>https://github.com/swimlane/ngx-charts</a:t>
+              <a:t>http://localhost:8080</a:t>
             </a:r>
             <a:endParaRPr lang="en-GB" dirty="0"/>
           </a:p>
@@ -6146,11 +6161,6 @@
             <a:endParaRPr lang="en-GB" dirty="0"/>
           </a:p>
           <a:p>
-            <a:pPr lvl="1"/>
-            <a:endParaRPr lang="en-GB" dirty="0"/>
-          </a:p>
-          <a:p>
-            <a:pPr lvl="1"/>
             <a:endParaRPr lang="en-GB" dirty="0"/>
           </a:p>
         </p:txBody>
@@ -6160,7 +6170,7 @@
           <p:cNvPr id="3" name="Title 2">
             <a:extLst>
               <a:ext uri="{FF2B5EF4-FFF2-40B4-BE49-F238E27FC236}">
-                <a16:creationId xmlns:a16="http://schemas.microsoft.com/office/drawing/2014/main" id="{9CCC34F1-6087-4A4C-8BB6-0E9C00A7E743}"/>
+                <a16:creationId xmlns:a16="http://schemas.microsoft.com/office/drawing/2014/main" id="{208B175A-03BE-433A-82D8-5CF799A69DF7}"/>
               </a:ext>
             </a:extLst>
           </p:cNvPr>
@@ -6176,14 +6186,17 @@
           <a:bodyPr/>
           <a:lstStyle/>
           <a:p>
-            <a:endParaRPr lang="en-GB"/>
+            <a:r>
+              <a:rPr lang="en-GB" dirty="0"/>
+              <a:t>Build the App</a:t>
+            </a:r>
           </a:p>
         </p:txBody>
       </p:sp>
     </p:spTree>
     <p:extLst>
       <p:ext uri="{BB962C8B-B14F-4D97-AF65-F5344CB8AC3E}">
-        <p14:creationId xmlns:p14="http://schemas.microsoft.com/office/powerpoint/2010/main" val="2636472956"/>
+        <p14:creationId xmlns:p14="http://schemas.microsoft.com/office/powerpoint/2010/main" val="1777565904"/>
       </p:ext>
     </p:extLst>
   </p:cSld>
@@ -6215,7 +6228,7 @@
           <p:cNvPr id="2" name="Content Placeholder 1">
             <a:extLst>
               <a:ext uri="{FF2B5EF4-FFF2-40B4-BE49-F238E27FC236}">
-                <a16:creationId xmlns:a16="http://schemas.microsoft.com/office/drawing/2014/main" id="{3E52E2CD-0F69-4B28-BCDE-B3D1E431F21F}"/>
+                <a16:creationId xmlns:a16="http://schemas.microsoft.com/office/drawing/2014/main" id="{09CB529D-071A-4CCF-8ED5-D1AA535AC3D8}"/>
               </a:ext>
             </a:extLst>
           </p:cNvPr>
@@ -6228,41 +6241,111 @@
         </p:nvSpPr>
         <p:spPr/>
         <p:txBody>
-          <a:bodyPr/>
+          <a:bodyPr>
+            <a:normAutofit lnSpcReduction="10000"/>
+          </a:bodyPr>
           <a:lstStyle/>
           <a:p>
             <a:r>
               <a:rPr lang="en-GB" dirty="0"/>
-              <a:t>F12 – developer tools</a:t>
-            </a:r>
-          </a:p>
-          <a:p>
-            <a:r>
-              <a:rPr lang="en-GB" dirty="0"/>
-              <a:t>add </a:t>
-            </a:r>
-            <a:r>
-              <a:rPr lang="en-GB" b="1" i="1" dirty="0"/>
-              <a:t>debugger</a:t>
-            </a:r>
-            <a:r>
-              <a:rPr lang="en-GB" dirty="0"/>
-              <a:t> on your code</a:t>
-            </a:r>
-          </a:p>
-          <a:p>
-            <a:r>
-              <a:rPr lang="en-GB" dirty="0"/>
-              <a:t>Can also use console.log(</a:t>
-            </a:r>
-            <a:r>
-              <a:rPr lang="en-GB" dirty="0" err="1"/>
-              <a:t>yourvar</a:t>
-            </a:r>
-            <a:r>
-              <a:rPr lang="en-GB" dirty="0"/>
-              <a:t>)  // to log to console</a:t>
-            </a:r>
+              <a:t>Resources</a:t>
+            </a:r>
+          </a:p>
+          <a:p>
+            <a:pPr lvl="1"/>
+            <a:r>
+              <a:rPr lang="en-GB" dirty="0"/>
+              <a:t>FLEX</a:t>
+            </a:r>
+          </a:p>
+          <a:p>
+            <a:pPr lvl="1"/>
+            <a:r>
+              <a:rPr lang="en-GB" dirty="0">
+                <a:hlinkClick r:id="rId2"/>
+              </a:rPr>
+              <a:t>https://tburleson-layouts-demos.firebaseapp.com/#/docs</a:t>
+            </a:r>
+            <a:endParaRPr lang="en-GB" dirty="0"/>
+          </a:p>
+          <a:p>
+            <a:pPr lvl="1"/>
+            <a:r>
+              <a:rPr lang="en-GB" dirty="0">
+                <a:hlinkClick r:id="rId3"/>
+              </a:rPr>
+              <a:t>https://blog.angularindepth.com/angular-flex-layout-flexbox-and-grid-layout-for-angular-component-6e7c24457b63</a:t>
+            </a:r>
+            <a:endParaRPr lang="en-GB" dirty="0"/>
+          </a:p>
+          <a:p>
+            <a:pPr lvl="1"/>
+            <a:r>
+              <a:rPr lang="en-GB" dirty="0">
+                <a:hlinkClick r:id="rId4"/>
+              </a:rPr>
+              <a:t>https://github.com/angular/flex-layout/wiki/fxFlex-API</a:t>
+            </a:r>
+            <a:endParaRPr lang="en-GB" dirty="0"/>
+          </a:p>
+          <a:p>
+            <a:pPr lvl="1"/>
+            <a:r>
+              <a:rPr lang="en-GB" dirty="0"/>
+              <a:t>NGX-CHARTS</a:t>
+            </a:r>
+          </a:p>
+          <a:p>
+            <a:pPr lvl="1"/>
+            <a:r>
+              <a:rPr lang="en-GB" dirty="0">
+                <a:hlinkClick r:id="rId5"/>
+              </a:rPr>
+              <a:t>https://swimlane.github.io/ngx-charts/</a:t>
+            </a:r>
+            <a:endParaRPr lang="en-GB" dirty="0"/>
+          </a:p>
+          <a:p>
+            <a:pPr lvl="1"/>
+            <a:r>
+              <a:rPr lang="en-GB" dirty="0">
+                <a:hlinkClick r:id="rId6"/>
+              </a:rPr>
+              <a:t>https://swimlane.gitbook.io/ngx-charts/</a:t>
+            </a:r>
+            <a:endParaRPr lang="en-GB" dirty="0"/>
+          </a:p>
+          <a:p>
+            <a:pPr lvl="1"/>
+            <a:r>
+              <a:rPr lang="en-GB" dirty="0">
+                <a:hlinkClick r:id="rId7"/>
+              </a:rPr>
+              <a:t>https://medium.com/@robertokedmenec/angular-2-with-ngx-charts-464efb9a2d5</a:t>
+            </a:r>
+            <a:endParaRPr lang="en-GB" dirty="0"/>
+          </a:p>
+          <a:p>
+            <a:pPr lvl="1"/>
+            <a:r>
+              <a:rPr lang="en-GB" dirty="0">
+                <a:hlinkClick r:id="rId8"/>
+              </a:rPr>
+              <a:t>https://github.com/swimlane/ngx-charts</a:t>
+            </a:r>
+            <a:endParaRPr lang="en-GB" dirty="0"/>
+          </a:p>
+          <a:p>
+            <a:pPr lvl="1"/>
+            <a:endParaRPr lang="en-GB" dirty="0"/>
+          </a:p>
+          <a:p>
+            <a:pPr lvl="1"/>
+            <a:endParaRPr lang="en-GB" dirty="0"/>
+          </a:p>
+          <a:p>
+            <a:pPr lvl="1"/>
+            <a:endParaRPr lang="en-GB" dirty="0"/>
           </a:p>
         </p:txBody>
       </p:sp>
@@ -6271,7 +6354,7 @@
           <p:cNvPr id="3" name="Title 2">
             <a:extLst>
               <a:ext uri="{FF2B5EF4-FFF2-40B4-BE49-F238E27FC236}">
-                <a16:creationId xmlns:a16="http://schemas.microsoft.com/office/drawing/2014/main" id="{75CA47B1-7EB5-4DBA-9EFD-58F6A2E84D0B}"/>
+                <a16:creationId xmlns:a16="http://schemas.microsoft.com/office/drawing/2014/main" id="{9CCC34F1-6087-4A4C-8BB6-0E9C00A7E743}"/>
               </a:ext>
             </a:extLst>
           </p:cNvPr>
@@ -6287,17 +6370,14 @@
           <a:bodyPr/>
           <a:lstStyle/>
           <a:p>
-            <a:r>
-              <a:rPr lang="en-GB" dirty="0"/>
-              <a:t>Debugger on chrome</a:t>
-            </a:r>
+            <a:endParaRPr lang="en-GB"/>
           </a:p>
         </p:txBody>
       </p:sp>
     </p:spTree>
     <p:extLst>
       <p:ext uri="{BB962C8B-B14F-4D97-AF65-F5344CB8AC3E}">
-        <p14:creationId xmlns:p14="http://schemas.microsoft.com/office/powerpoint/2010/main" val="2019522948"/>
+        <p14:creationId xmlns:p14="http://schemas.microsoft.com/office/powerpoint/2010/main" val="2636472956"/>
       </p:ext>
     </p:extLst>
   </p:cSld>
@@ -6329,7 +6409,7 @@
           <p:cNvPr id="2" name="Content Placeholder 1">
             <a:extLst>
               <a:ext uri="{FF2B5EF4-FFF2-40B4-BE49-F238E27FC236}">
-                <a16:creationId xmlns:a16="http://schemas.microsoft.com/office/drawing/2014/main" id="{74A0DDF0-1390-48F5-8871-ACD0459876DF}"/>
+                <a16:creationId xmlns:a16="http://schemas.microsoft.com/office/drawing/2014/main" id="{3E52E2CD-0F69-4B28-BCDE-B3D1E431F21F}"/>
               </a:ext>
             </a:extLst>
           </p:cNvPr>
@@ -6342,108 +6422,41 @@
         </p:nvSpPr>
         <p:spPr/>
         <p:txBody>
-          <a:bodyPr>
-            <a:normAutofit fontScale="92500" lnSpcReduction="20000"/>
-          </a:bodyPr>
+          <a:bodyPr/>
           <a:lstStyle/>
           <a:p>
             <a:r>
-              <a:rPr lang="en-GB"/>
-              <a:t>Explain</a:t>
-            </a:r>
-            <a:endParaRPr lang="en-GB" dirty="0"/>
-          </a:p>
-          <a:p>
-            <a:pPr lvl="1"/>
-            <a:r>
-              <a:rPr lang="en-GB" dirty="0"/>
-              <a:t>How does it work</a:t>
-            </a:r>
-          </a:p>
-          <a:p>
-            <a:pPr lvl="1"/>
-            <a:r>
-              <a:rPr lang="en-GB" dirty="0"/>
-              <a:t>Show app-component</a:t>
-            </a:r>
-          </a:p>
-          <a:p>
-            <a:pPr lvl="1"/>
-            <a:r>
-              <a:rPr lang="en-GB" dirty="0"/>
-              <a:t>Show index.html and </a:t>
+              <a:rPr lang="en-GB" dirty="0"/>
+              <a:t>F12 – developer tools</a:t>
+            </a:r>
+          </a:p>
+          <a:p>
+            <a:r>
+              <a:rPr lang="en-GB" dirty="0"/>
+              <a:t>add </a:t>
+            </a:r>
+            <a:r>
+              <a:rPr lang="en-GB" b="1" i="1" dirty="0"/>
+              <a:t>debugger</a:t>
+            </a:r>
+            <a:r>
+              <a:rPr lang="en-GB" dirty="0"/>
+              <a:t> on your code</a:t>
+            </a:r>
+          </a:p>
+          <a:p>
+            <a:r>
+              <a:rPr lang="en-GB" dirty="0"/>
+              <a:t>Can also use console.log(</a:t>
             </a:r>
             <a:r>
               <a:rPr lang="en-GB" dirty="0" err="1"/>
-              <a:t>app.component</a:t>
-            </a:r>
-            <a:r>
-              <a:rPr lang="en-GB" dirty="0"/>
-              <a:t>-html</a:t>
-            </a:r>
-          </a:p>
-          <a:p>
-            <a:r>
-              <a:rPr lang="en-GB" dirty="0" err="1"/>
-              <a:t>Mak</a:t>
-            </a:r>
-            <a:r>
-              <a:rPr lang="en-GB" dirty="0"/>
-              <a:t> changes</a:t>
-            </a:r>
-          </a:p>
-          <a:p>
-            <a:pPr lvl="1"/>
-            <a:r>
-              <a:rPr lang="en-GB" dirty="0"/>
-              <a:t>Change title</a:t>
-            </a:r>
-          </a:p>
-          <a:p>
-            <a:pPr lvl="1"/>
-            <a:r>
-              <a:rPr lang="en-GB" dirty="0"/>
-              <a:t>Dynamic HTML</a:t>
-            </a:r>
-          </a:p>
-          <a:p>
-            <a:pPr lvl="1"/>
-            <a:r>
-              <a:rPr lang="en-GB" dirty="0"/>
-              <a:t>Add property</a:t>
-            </a:r>
-          </a:p>
-          <a:p>
-            <a:pPr lvl="1"/>
-            <a:r>
-              <a:rPr lang="en-GB" dirty="0"/>
-              <a:t>Add input</a:t>
-            </a:r>
-          </a:p>
-          <a:p>
-            <a:pPr lvl="1"/>
-            <a:r>
-              <a:rPr lang="en-GB" dirty="0"/>
-              <a:t>Add </a:t>
-            </a:r>
-            <a:r>
-              <a:rPr lang="en-GB" dirty="0" err="1"/>
-              <a:t>FormsModule</a:t>
-            </a:r>
-            <a:endParaRPr lang="en-GB" dirty="0"/>
-          </a:p>
-          <a:p>
-            <a:endParaRPr lang="en-GB" dirty="0"/>
-          </a:p>
-          <a:p>
-            <a:r>
-              <a:rPr lang="en-GB" dirty="0"/>
-              <a:t>Show chrome debugger</a:t>
-            </a:r>
-          </a:p>
-          <a:p>
-            <a:pPr lvl="1"/>
-            <a:endParaRPr lang="en-GB" dirty="0"/>
+              <a:t>yourvar</a:t>
+            </a:r>
+            <a:r>
+              <a:rPr lang="en-GB" dirty="0"/>
+              <a:t>)  // to log to console</a:t>
+            </a:r>
           </a:p>
         </p:txBody>
       </p:sp>
@@ -6452,7 +6465,7 @@
           <p:cNvPr id="3" name="Title 2">
             <a:extLst>
               <a:ext uri="{FF2B5EF4-FFF2-40B4-BE49-F238E27FC236}">
-                <a16:creationId xmlns:a16="http://schemas.microsoft.com/office/drawing/2014/main" id="{F7F9F412-24E1-4F23-8DA5-D76D3EFF48C2}"/>
+                <a16:creationId xmlns:a16="http://schemas.microsoft.com/office/drawing/2014/main" id="{75CA47B1-7EB5-4DBA-9EFD-58F6A2E84D0B}"/>
               </a:ext>
             </a:extLst>
           </p:cNvPr>
@@ -6470,7 +6483,7 @@
           <a:p>
             <a:r>
               <a:rPr lang="en-GB" dirty="0"/>
-              <a:t>Building your first app</a:t>
+              <a:t>Debugger on chrome</a:t>
             </a:r>
           </a:p>
         </p:txBody>
@@ -6478,7 +6491,7 @@
     </p:spTree>
     <p:extLst>
       <p:ext uri="{BB962C8B-B14F-4D97-AF65-F5344CB8AC3E}">
-        <p14:creationId xmlns:p14="http://schemas.microsoft.com/office/powerpoint/2010/main" val="3823467780"/>
+        <p14:creationId xmlns:p14="http://schemas.microsoft.com/office/powerpoint/2010/main" val="2019522948"/>
       </p:ext>
     </p:extLst>
   </p:cSld>
@@ -6620,6 +6633,2306 @@
 </file>
 
 <file path=ppt/slides/slide20.xml><?xml version="1.0" encoding="utf-8"?>
+<p:sld xmlns:a="http://schemas.openxmlformats.org/drawingml/2006/main" xmlns:r="http://schemas.openxmlformats.org/officeDocument/2006/relationships" xmlns:p="http://schemas.openxmlformats.org/presentationml/2006/main">
+  <p:cSld>
+    <p:spTree>
+      <p:nvGrpSpPr>
+        <p:cNvPr id="1" name=""/>
+        <p:cNvGrpSpPr/>
+        <p:nvPr/>
+      </p:nvGrpSpPr>
+      <p:grpSpPr>
+        <a:xfrm>
+          <a:off x="0" y="0"/>
+          <a:ext cx="0" cy="0"/>
+          <a:chOff x="0" y="0"/>
+          <a:chExt cx="0" cy="0"/>
+        </a:xfrm>
+      </p:grpSpPr>
+      <p:sp>
+        <p:nvSpPr>
+          <p:cNvPr id="2" name="Content Placeholder 1">
+            <a:extLst>
+              <a:ext uri="{FF2B5EF4-FFF2-40B4-BE49-F238E27FC236}">
+                <a16:creationId xmlns:a16="http://schemas.microsoft.com/office/drawing/2014/main" id="{74A0DDF0-1390-48F5-8871-ACD0459876DF}"/>
+              </a:ext>
+            </a:extLst>
+          </p:cNvPr>
+          <p:cNvSpPr>
+            <a:spLocks noGrp="1"/>
+          </p:cNvSpPr>
+          <p:nvPr>
+            <p:ph sz="quarter" idx="10"/>
+          </p:nvPr>
+        </p:nvSpPr>
+        <p:spPr/>
+        <p:txBody>
+          <a:bodyPr>
+            <a:normAutofit fontScale="92500" lnSpcReduction="20000"/>
+          </a:bodyPr>
+          <a:lstStyle/>
+          <a:p>
+            <a:r>
+              <a:rPr lang="en-GB"/>
+              <a:t>Explain</a:t>
+            </a:r>
+            <a:endParaRPr lang="en-GB" dirty="0"/>
+          </a:p>
+          <a:p>
+            <a:pPr lvl="1"/>
+            <a:r>
+              <a:rPr lang="en-GB" dirty="0"/>
+              <a:t>How does it work</a:t>
+            </a:r>
+          </a:p>
+          <a:p>
+            <a:pPr lvl="1"/>
+            <a:r>
+              <a:rPr lang="en-GB" dirty="0"/>
+              <a:t>Show app-component</a:t>
+            </a:r>
+          </a:p>
+          <a:p>
+            <a:pPr lvl="1"/>
+            <a:r>
+              <a:rPr lang="en-GB" dirty="0"/>
+              <a:t>Show index.html and </a:t>
+            </a:r>
+            <a:r>
+              <a:rPr lang="en-GB" dirty="0" err="1"/>
+              <a:t>app.component</a:t>
+            </a:r>
+            <a:r>
+              <a:rPr lang="en-GB" dirty="0"/>
+              <a:t>-html</a:t>
+            </a:r>
+          </a:p>
+          <a:p>
+            <a:r>
+              <a:rPr lang="en-GB" dirty="0" err="1"/>
+              <a:t>Mak</a:t>
+            </a:r>
+            <a:r>
+              <a:rPr lang="en-GB" dirty="0"/>
+              <a:t> changes</a:t>
+            </a:r>
+          </a:p>
+          <a:p>
+            <a:pPr lvl="1"/>
+            <a:r>
+              <a:rPr lang="en-GB" dirty="0"/>
+              <a:t>Change title</a:t>
+            </a:r>
+          </a:p>
+          <a:p>
+            <a:pPr lvl="1"/>
+            <a:r>
+              <a:rPr lang="en-GB" dirty="0"/>
+              <a:t>Dynamic HTML</a:t>
+            </a:r>
+          </a:p>
+          <a:p>
+            <a:pPr lvl="1"/>
+            <a:r>
+              <a:rPr lang="en-GB" dirty="0"/>
+              <a:t>Add property</a:t>
+            </a:r>
+          </a:p>
+          <a:p>
+            <a:pPr lvl="1"/>
+            <a:r>
+              <a:rPr lang="en-GB" dirty="0"/>
+              <a:t>Add input</a:t>
+            </a:r>
+          </a:p>
+          <a:p>
+            <a:pPr lvl="1"/>
+            <a:r>
+              <a:rPr lang="en-GB" dirty="0"/>
+              <a:t>Add </a:t>
+            </a:r>
+            <a:r>
+              <a:rPr lang="en-GB" dirty="0" err="1"/>
+              <a:t>FormsModule</a:t>
+            </a:r>
+            <a:endParaRPr lang="en-GB" dirty="0"/>
+          </a:p>
+          <a:p>
+            <a:endParaRPr lang="en-GB" dirty="0"/>
+          </a:p>
+          <a:p>
+            <a:r>
+              <a:rPr lang="en-GB" dirty="0"/>
+              <a:t>Show chrome debugger</a:t>
+            </a:r>
+          </a:p>
+          <a:p>
+            <a:pPr lvl="1"/>
+            <a:endParaRPr lang="en-GB" dirty="0"/>
+          </a:p>
+        </p:txBody>
+      </p:sp>
+      <p:sp>
+        <p:nvSpPr>
+          <p:cNvPr id="3" name="Title 2">
+            <a:extLst>
+              <a:ext uri="{FF2B5EF4-FFF2-40B4-BE49-F238E27FC236}">
+                <a16:creationId xmlns:a16="http://schemas.microsoft.com/office/drawing/2014/main" id="{F7F9F412-24E1-4F23-8DA5-D76D3EFF48C2}"/>
+              </a:ext>
+            </a:extLst>
+          </p:cNvPr>
+          <p:cNvSpPr>
+            <a:spLocks noGrp="1"/>
+          </p:cNvSpPr>
+          <p:nvPr>
+            <p:ph type="title"/>
+          </p:nvPr>
+        </p:nvSpPr>
+        <p:spPr/>
+        <p:txBody>
+          <a:bodyPr/>
+          <a:lstStyle/>
+          <a:p>
+            <a:r>
+              <a:rPr lang="en-GB" dirty="0"/>
+              <a:t>Building your first app</a:t>
+            </a:r>
+          </a:p>
+        </p:txBody>
+      </p:sp>
+    </p:spTree>
+    <p:extLst>
+      <p:ext uri="{BB962C8B-B14F-4D97-AF65-F5344CB8AC3E}">
+        <p14:creationId xmlns:p14="http://schemas.microsoft.com/office/powerpoint/2010/main" val="3823467780"/>
+      </p:ext>
+    </p:extLst>
+  </p:cSld>
+  <p:clrMapOvr>
+    <a:masterClrMapping/>
+  </p:clrMapOvr>
+</p:sld>
+</file>
+
+<file path=ppt/slides/slide21.xml><?xml version="1.0" encoding="utf-8"?>
+<p:sld xmlns:a="http://schemas.openxmlformats.org/drawingml/2006/main" xmlns:r="http://schemas.openxmlformats.org/officeDocument/2006/relationships" xmlns:p="http://schemas.openxmlformats.org/presentationml/2006/main">
+  <p:cSld>
+    <p:spTree>
+      <p:nvGrpSpPr>
+        <p:cNvPr id="1" name=""/>
+        <p:cNvGrpSpPr/>
+        <p:nvPr/>
+      </p:nvGrpSpPr>
+      <p:grpSpPr>
+        <a:xfrm>
+          <a:off x="0" y="0"/>
+          <a:ext cx="0" cy="0"/>
+          <a:chOff x="0" y="0"/>
+          <a:chExt cx="0" cy="0"/>
+        </a:xfrm>
+      </p:grpSpPr>
+      <p:sp>
+        <p:nvSpPr>
+          <p:cNvPr id="2" name="Content Placeholder 1">
+            <a:extLst>
+              <a:ext uri="{FF2B5EF4-FFF2-40B4-BE49-F238E27FC236}">
+                <a16:creationId xmlns:a16="http://schemas.microsoft.com/office/drawing/2014/main" id="{AAD94742-2C4B-48E3-9F49-01458C5B2276}"/>
+              </a:ext>
+            </a:extLst>
+          </p:cNvPr>
+          <p:cNvSpPr>
+            <a:spLocks noGrp="1"/>
+          </p:cNvSpPr>
+          <p:nvPr>
+            <p:ph sz="quarter" idx="10"/>
+          </p:nvPr>
+        </p:nvSpPr>
+        <p:spPr/>
+        <p:txBody>
+          <a:bodyPr/>
+          <a:lstStyle/>
+          <a:p>
+            <a:r>
+              <a:rPr lang="en-GB" dirty="0"/>
+              <a:t>Building a navigation structure on NS4 for sales</a:t>
+            </a:r>
+          </a:p>
+          <a:p>
+            <a:endParaRPr lang="en-GB" dirty="0"/>
+          </a:p>
+        </p:txBody>
+      </p:sp>
+      <p:sp>
+        <p:nvSpPr>
+          <p:cNvPr id="3" name="Title 2">
+            <a:extLst>
+              <a:ext uri="{FF2B5EF4-FFF2-40B4-BE49-F238E27FC236}">
+                <a16:creationId xmlns:a16="http://schemas.microsoft.com/office/drawing/2014/main" id="{9CCA1BFE-D728-41F5-94D3-B7D279261DF5}"/>
+              </a:ext>
+            </a:extLst>
+          </p:cNvPr>
+          <p:cNvSpPr>
+            <a:spLocks noGrp="1"/>
+          </p:cNvSpPr>
+          <p:nvPr>
+            <p:ph type="title"/>
+          </p:nvPr>
+        </p:nvSpPr>
+        <p:spPr/>
+        <p:txBody>
+          <a:bodyPr/>
+          <a:lstStyle/>
+          <a:p>
+            <a:r>
+              <a:rPr lang="en-GB" dirty="0"/>
+              <a:t>Sales applications on NS4</a:t>
+            </a:r>
+          </a:p>
+        </p:txBody>
+      </p:sp>
+    </p:spTree>
+    <p:extLst>
+      <p:ext uri="{BB962C8B-B14F-4D97-AF65-F5344CB8AC3E}">
+        <p14:creationId xmlns:p14="http://schemas.microsoft.com/office/powerpoint/2010/main" val="148856562"/>
+      </p:ext>
+    </p:extLst>
+  </p:cSld>
+  <p:clrMapOvr>
+    <a:masterClrMapping/>
+  </p:clrMapOvr>
+</p:sld>
+</file>
+
+<file path=ppt/slides/slide22.xml><?xml version="1.0" encoding="utf-8"?>
+<p:sld xmlns:a="http://schemas.openxmlformats.org/drawingml/2006/main" xmlns:r="http://schemas.openxmlformats.org/officeDocument/2006/relationships" xmlns:p="http://schemas.openxmlformats.org/presentationml/2006/main">
+  <p:cSld>
+    <p:spTree>
+      <p:nvGrpSpPr>
+        <p:cNvPr id="1" name=""/>
+        <p:cNvGrpSpPr/>
+        <p:nvPr/>
+      </p:nvGrpSpPr>
+      <p:grpSpPr>
+        <a:xfrm>
+          <a:off x="0" y="0"/>
+          <a:ext cx="0" cy="0"/>
+          <a:chOff x="0" y="0"/>
+          <a:chExt cx="0" cy="0"/>
+        </a:xfrm>
+      </p:grpSpPr>
+      <p:sp>
+        <p:nvSpPr>
+          <p:cNvPr id="4" name="Rectangle 3">
+            <a:extLst>
+              <a:ext uri="{FF2B5EF4-FFF2-40B4-BE49-F238E27FC236}">
+                <a16:creationId xmlns:a16="http://schemas.microsoft.com/office/drawing/2014/main" id="{3BF72E20-A6A1-47FD-A7A1-280A47A3CEFD}"/>
+              </a:ext>
+            </a:extLst>
+          </p:cNvPr>
+          <p:cNvSpPr/>
+          <p:nvPr/>
+        </p:nvSpPr>
+        <p:spPr>
+          <a:xfrm>
+            <a:off x="5421923" y="354625"/>
+            <a:ext cx="1225062" cy="592014"/>
+          </a:xfrm>
+          <a:prstGeom prst="rect">
+            <a:avLst/>
+          </a:prstGeom>
+        </p:spPr>
+        <p:style>
+          <a:lnRef idx="2">
+            <a:schemeClr val="accent1">
+              <a:shade val="50000"/>
+            </a:schemeClr>
+          </a:lnRef>
+          <a:fillRef idx="1">
+            <a:schemeClr val="accent1"/>
+          </a:fillRef>
+          <a:effectRef idx="0">
+            <a:schemeClr val="accent1"/>
+          </a:effectRef>
+          <a:fontRef idx="minor">
+            <a:schemeClr val="lt1"/>
+          </a:fontRef>
+        </p:style>
+        <p:txBody>
+          <a:bodyPr rtlCol="0" anchor="ctr"/>
+          <a:lstStyle/>
+          <a:p>
+            <a:pPr algn="ctr"/>
+            <a:r>
+              <a:rPr lang="en-GB" sz="1100" dirty="0">
+                <a:solidFill>
+                  <a:schemeClr val="tx1"/>
+                </a:solidFill>
+              </a:rPr>
+              <a:t>Sales</a:t>
+            </a:r>
+          </a:p>
+        </p:txBody>
+      </p:sp>
+      <p:sp>
+        <p:nvSpPr>
+          <p:cNvPr id="5" name="Rectangle 4">
+            <a:extLst>
+              <a:ext uri="{FF2B5EF4-FFF2-40B4-BE49-F238E27FC236}">
+                <a16:creationId xmlns:a16="http://schemas.microsoft.com/office/drawing/2014/main" id="{E22E87B2-5CA4-4C68-8354-727C30CC515E}"/>
+              </a:ext>
+            </a:extLst>
+          </p:cNvPr>
+          <p:cNvSpPr/>
+          <p:nvPr/>
+        </p:nvSpPr>
+        <p:spPr>
+          <a:xfrm>
+            <a:off x="2608383" y="1148863"/>
+            <a:ext cx="1225062" cy="592014"/>
+          </a:xfrm>
+          <a:prstGeom prst="rect">
+            <a:avLst/>
+          </a:prstGeom>
+        </p:spPr>
+        <p:style>
+          <a:lnRef idx="2">
+            <a:schemeClr val="accent1">
+              <a:shade val="50000"/>
+            </a:schemeClr>
+          </a:lnRef>
+          <a:fillRef idx="1">
+            <a:schemeClr val="accent1"/>
+          </a:fillRef>
+          <a:effectRef idx="0">
+            <a:schemeClr val="accent1"/>
+          </a:effectRef>
+          <a:fontRef idx="minor">
+            <a:schemeClr val="lt1"/>
+          </a:fontRef>
+        </p:style>
+        <p:txBody>
+          <a:bodyPr rtlCol="0" anchor="ctr"/>
+          <a:lstStyle/>
+          <a:p>
+            <a:pPr algn="ctr"/>
+            <a:r>
+              <a:rPr lang="en-GB" sz="1100" dirty="0">
+                <a:solidFill>
+                  <a:schemeClr val="tx1"/>
+                </a:solidFill>
+              </a:rPr>
+              <a:t>Sales Dashboard</a:t>
+            </a:r>
+          </a:p>
+        </p:txBody>
+      </p:sp>
+      <p:sp>
+        <p:nvSpPr>
+          <p:cNvPr id="6" name="Rectangle 5">
+            <a:extLst>
+              <a:ext uri="{FF2B5EF4-FFF2-40B4-BE49-F238E27FC236}">
+                <a16:creationId xmlns:a16="http://schemas.microsoft.com/office/drawing/2014/main" id="{C62CE3A9-13D5-4073-B7DE-1E00C2254367}"/>
+              </a:ext>
+            </a:extLst>
+          </p:cNvPr>
+          <p:cNvSpPr/>
+          <p:nvPr/>
+        </p:nvSpPr>
+        <p:spPr>
+          <a:xfrm>
+            <a:off x="4015153" y="1148863"/>
+            <a:ext cx="1225062" cy="592014"/>
+          </a:xfrm>
+          <a:prstGeom prst="rect">
+            <a:avLst/>
+          </a:prstGeom>
+        </p:spPr>
+        <p:style>
+          <a:lnRef idx="2">
+            <a:schemeClr val="accent1">
+              <a:shade val="50000"/>
+            </a:schemeClr>
+          </a:lnRef>
+          <a:fillRef idx="1">
+            <a:schemeClr val="accent1"/>
+          </a:fillRef>
+          <a:effectRef idx="0">
+            <a:schemeClr val="accent1"/>
+          </a:effectRef>
+          <a:fontRef idx="minor">
+            <a:schemeClr val="lt1"/>
+          </a:fontRef>
+        </p:style>
+        <p:txBody>
+          <a:bodyPr rtlCol="0" anchor="ctr"/>
+          <a:lstStyle/>
+          <a:p>
+            <a:pPr algn="ctr"/>
+            <a:r>
+              <a:rPr lang="en-GB" sz="1100" dirty="0">
+                <a:solidFill>
+                  <a:schemeClr val="tx1"/>
+                </a:solidFill>
+              </a:rPr>
+              <a:t>Customer list</a:t>
+            </a:r>
+          </a:p>
+        </p:txBody>
+      </p:sp>
+      <p:sp>
+        <p:nvSpPr>
+          <p:cNvPr id="7" name="Rectangle 6">
+            <a:extLst>
+              <a:ext uri="{FF2B5EF4-FFF2-40B4-BE49-F238E27FC236}">
+                <a16:creationId xmlns:a16="http://schemas.microsoft.com/office/drawing/2014/main" id="{DA42CA36-A7B8-433A-BA9D-6E798FD8F933}"/>
+              </a:ext>
+            </a:extLst>
+          </p:cNvPr>
+          <p:cNvSpPr/>
+          <p:nvPr/>
+        </p:nvSpPr>
+        <p:spPr>
+          <a:xfrm>
+            <a:off x="5421923" y="1148863"/>
+            <a:ext cx="1225062" cy="592014"/>
+          </a:xfrm>
+          <a:prstGeom prst="rect">
+            <a:avLst/>
+          </a:prstGeom>
+        </p:spPr>
+        <p:style>
+          <a:lnRef idx="2">
+            <a:schemeClr val="accent1">
+              <a:shade val="50000"/>
+            </a:schemeClr>
+          </a:lnRef>
+          <a:fillRef idx="1">
+            <a:schemeClr val="accent1"/>
+          </a:fillRef>
+          <a:effectRef idx="0">
+            <a:schemeClr val="accent1"/>
+          </a:effectRef>
+          <a:fontRef idx="minor">
+            <a:schemeClr val="lt1"/>
+          </a:fontRef>
+        </p:style>
+        <p:txBody>
+          <a:bodyPr rtlCol="0" anchor="ctr"/>
+          <a:lstStyle/>
+          <a:p>
+            <a:pPr algn="ctr"/>
+            <a:r>
+              <a:rPr lang="en-GB" sz="1100" dirty="0">
+                <a:solidFill>
+                  <a:schemeClr val="tx1"/>
+                </a:solidFill>
+              </a:rPr>
+              <a:t>Sales </a:t>
+            </a:r>
+            <a:r>
+              <a:rPr lang="en-GB" sz="1100" dirty="0" err="1">
+                <a:solidFill>
+                  <a:schemeClr val="tx1"/>
+                </a:solidFill>
+              </a:rPr>
+              <a:t>kpi</a:t>
+            </a:r>
+            <a:endParaRPr lang="en-GB" sz="1100" dirty="0">
+              <a:solidFill>
+                <a:schemeClr val="tx1"/>
+              </a:solidFill>
+            </a:endParaRPr>
+          </a:p>
+        </p:txBody>
+      </p:sp>
+      <p:sp>
+        <p:nvSpPr>
+          <p:cNvPr id="8" name="Rectangle 7">
+            <a:extLst>
+              <a:ext uri="{FF2B5EF4-FFF2-40B4-BE49-F238E27FC236}">
+                <a16:creationId xmlns:a16="http://schemas.microsoft.com/office/drawing/2014/main" id="{5E18159B-F08E-492F-983F-5B44299D1A95}"/>
+              </a:ext>
+            </a:extLst>
+          </p:cNvPr>
+          <p:cNvSpPr/>
+          <p:nvPr/>
+        </p:nvSpPr>
+        <p:spPr>
+          <a:xfrm>
+            <a:off x="6822831" y="1148863"/>
+            <a:ext cx="1225062" cy="592014"/>
+          </a:xfrm>
+          <a:prstGeom prst="rect">
+            <a:avLst/>
+          </a:prstGeom>
+        </p:spPr>
+        <p:style>
+          <a:lnRef idx="2">
+            <a:schemeClr val="accent1">
+              <a:shade val="50000"/>
+            </a:schemeClr>
+          </a:lnRef>
+          <a:fillRef idx="1">
+            <a:schemeClr val="accent1"/>
+          </a:fillRef>
+          <a:effectRef idx="0">
+            <a:schemeClr val="accent1"/>
+          </a:effectRef>
+          <a:fontRef idx="minor">
+            <a:schemeClr val="lt1"/>
+          </a:fontRef>
+        </p:style>
+        <p:txBody>
+          <a:bodyPr rtlCol="0" anchor="ctr"/>
+          <a:lstStyle/>
+          <a:p>
+            <a:pPr algn="ctr"/>
+            <a:r>
+              <a:rPr lang="en-GB" sz="1100" dirty="0">
+                <a:solidFill>
+                  <a:schemeClr val="tx1"/>
+                </a:solidFill>
+              </a:rPr>
+              <a:t>Capacity</a:t>
+            </a:r>
+          </a:p>
+        </p:txBody>
+      </p:sp>
+      <p:sp>
+        <p:nvSpPr>
+          <p:cNvPr id="9" name="Rectangle 8">
+            <a:extLst>
+              <a:ext uri="{FF2B5EF4-FFF2-40B4-BE49-F238E27FC236}">
+                <a16:creationId xmlns:a16="http://schemas.microsoft.com/office/drawing/2014/main" id="{94F42902-70C1-4C46-9A3D-BAC9F1329371}"/>
+              </a:ext>
+            </a:extLst>
+          </p:cNvPr>
+          <p:cNvSpPr/>
+          <p:nvPr/>
+        </p:nvSpPr>
+        <p:spPr>
+          <a:xfrm>
+            <a:off x="6822831" y="1960686"/>
+            <a:ext cx="1225062" cy="592014"/>
+          </a:xfrm>
+          <a:prstGeom prst="rect">
+            <a:avLst/>
+          </a:prstGeom>
+        </p:spPr>
+        <p:style>
+          <a:lnRef idx="2">
+            <a:schemeClr val="accent1">
+              <a:shade val="50000"/>
+            </a:schemeClr>
+          </a:lnRef>
+          <a:fillRef idx="1">
+            <a:schemeClr val="accent1"/>
+          </a:fillRef>
+          <a:effectRef idx="0">
+            <a:schemeClr val="accent1"/>
+          </a:effectRef>
+          <a:fontRef idx="minor">
+            <a:schemeClr val="lt1"/>
+          </a:fontRef>
+        </p:style>
+        <p:txBody>
+          <a:bodyPr rtlCol="0" anchor="ctr"/>
+          <a:lstStyle/>
+          <a:p>
+            <a:pPr algn="ctr"/>
+            <a:r>
+              <a:rPr lang="en-GB" sz="1100" dirty="0">
+                <a:solidFill>
+                  <a:schemeClr val="tx1"/>
+                </a:solidFill>
+              </a:rPr>
+              <a:t>Production plan</a:t>
+            </a:r>
+          </a:p>
+        </p:txBody>
+      </p:sp>
+      <p:sp>
+        <p:nvSpPr>
+          <p:cNvPr id="10" name="Rectangle 9">
+            <a:extLst>
+              <a:ext uri="{FF2B5EF4-FFF2-40B4-BE49-F238E27FC236}">
+                <a16:creationId xmlns:a16="http://schemas.microsoft.com/office/drawing/2014/main" id="{4CB15BC0-AE03-4D63-9B5F-750DD23F4A9A}"/>
+              </a:ext>
+            </a:extLst>
+          </p:cNvPr>
+          <p:cNvSpPr/>
+          <p:nvPr/>
+        </p:nvSpPr>
+        <p:spPr>
+          <a:xfrm>
+            <a:off x="8247185" y="1960686"/>
+            <a:ext cx="1225062" cy="592014"/>
+          </a:xfrm>
+          <a:prstGeom prst="rect">
+            <a:avLst/>
+          </a:prstGeom>
+        </p:spPr>
+        <p:style>
+          <a:lnRef idx="2">
+            <a:schemeClr val="accent1">
+              <a:shade val="50000"/>
+            </a:schemeClr>
+          </a:lnRef>
+          <a:fillRef idx="1">
+            <a:schemeClr val="accent1"/>
+          </a:fillRef>
+          <a:effectRef idx="0">
+            <a:schemeClr val="accent1"/>
+          </a:effectRef>
+          <a:fontRef idx="minor">
+            <a:schemeClr val="lt1"/>
+          </a:fontRef>
+        </p:style>
+        <p:txBody>
+          <a:bodyPr rtlCol="0" anchor="ctr"/>
+          <a:lstStyle/>
+          <a:p>
+            <a:pPr algn="ctr"/>
+            <a:r>
+              <a:rPr lang="en-GB" sz="1100" dirty="0">
+                <a:solidFill>
+                  <a:schemeClr val="tx1"/>
+                </a:solidFill>
+              </a:rPr>
+              <a:t>Capacity avail</a:t>
+            </a:r>
+          </a:p>
+        </p:txBody>
+      </p:sp>
+      <p:cxnSp>
+        <p:nvCxnSpPr>
+          <p:cNvPr id="12" name="Straight Arrow Connector 11">
+            <a:extLst>
+              <a:ext uri="{FF2B5EF4-FFF2-40B4-BE49-F238E27FC236}">
+                <a16:creationId xmlns:a16="http://schemas.microsoft.com/office/drawing/2014/main" id="{A3D6149C-F48D-4B0F-9CE7-48E262A16536}"/>
+              </a:ext>
+            </a:extLst>
+          </p:cNvPr>
+          <p:cNvCxnSpPr>
+            <a:stCxn id="8" idx="2"/>
+            <a:endCxn id="9" idx="0"/>
+          </p:cNvCxnSpPr>
+          <p:nvPr/>
+        </p:nvCxnSpPr>
+        <p:spPr>
+          <a:xfrm>
+            <a:off x="7435362" y="1740877"/>
+            <a:ext cx="0" cy="219809"/>
+          </a:xfrm>
+          <a:prstGeom prst="straightConnector1">
+            <a:avLst/>
+          </a:prstGeom>
+          <a:ln>
+            <a:tailEnd type="triangle"/>
+          </a:ln>
+        </p:spPr>
+        <p:style>
+          <a:lnRef idx="1">
+            <a:schemeClr val="accent1"/>
+          </a:lnRef>
+          <a:fillRef idx="0">
+            <a:schemeClr val="accent1"/>
+          </a:fillRef>
+          <a:effectRef idx="0">
+            <a:schemeClr val="accent1"/>
+          </a:effectRef>
+          <a:fontRef idx="minor">
+            <a:schemeClr val="tx1"/>
+          </a:fontRef>
+        </p:style>
+      </p:cxnSp>
+      <p:cxnSp>
+        <p:nvCxnSpPr>
+          <p:cNvPr id="14" name="Straight Arrow Connector 13">
+            <a:extLst>
+              <a:ext uri="{FF2B5EF4-FFF2-40B4-BE49-F238E27FC236}">
+                <a16:creationId xmlns:a16="http://schemas.microsoft.com/office/drawing/2014/main" id="{6E7C1D9E-C4C9-46AF-95AF-4D6C4795C8AA}"/>
+              </a:ext>
+            </a:extLst>
+          </p:cNvPr>
+          <p:cNvCxnSpPr>
+            <a:cxnSpLocks/>
+            <a:stCxn id="4" idx="2"/>
+            <a:endCxn id="34" idx="0"/>
+          </p:cNvCxnSpPr>
+          <p:nvPr/>
+        </p:nvCxnSpPr>
+        <p:spPr>
+          <a:xfrm>
+            <a:off x="6034454" y="946639"/>
+            <a:ext cx="2828096" cy="177998"/>
+          </a:xfrm>
+          <a:prstGeom prst="straightConnector1">
+            <a:avLst/>
+          </a:prstGeom>
+          <a:ln>
+            <a:tailEnd type="triangle"/>
+          </a:ln>
+        </p:spPr>
+        <p:style>
+          <a:lnRef idx="1">
+            <a:schemeClr val="accent1"/>
+          </a:lnRef>
+          <a:fillRef idx="0">
+            <a:schemeClr val="accent1"/>
+          </a:fillRef>
+          <a:effectRef idx="0">
+            <a:schemeClr val="accent1"/>
+          </a:effectRef>
+          <a:fontRef idx="minor">
+            <a:schemeClr val="tx1"/>
+          </a:fontRef>
+        </p:style>
+      </p:cxnSp>
+      <p:cxnSp>
+        <p:nvCxnSpPr>
+          <p:cNvPr id="16" name="Straight Arrow Connector 15">
+            <a:extLst>
+              <a:ext uri="{FF2B5EF4-FFF2-40B4-BE49-F238E27FC236}">
+                <a16:creationId xmlns:a16="http://schemas.microsoft.com/office/drawing/2014/main" id="{2E629A9F-4F7D-4473-BE3A-AD95E67CF3C4}"/>
+              </a:ext>
+            </a:extLst>
+          </p:cNvPr>
+          <p:cNvCxnSpPr>
+            <a:cxnSpLocks/>
+            <a:stCxn id="4" idx="2"/>
+            <a:endCxn id="5" idx="0"/>
+          </p:cNvCxnSpPr>
+          <p:nvPr/>
+        </p:nvCxnSpPr>
+        <p:spPr>
+          <a:xfrm flipH="1">
+            <a:off x="3220914" y="946639"/>
+            <a:ext cx="2813540" cy="202224"/>
+          </a:xfrm>
+          <a:prstGeom prst="straightConnector1">
+            <a:avLst/>
+          </a:prstGeom>
+          <a:ln>
+            <a:tailEnd type="triangle"/>
+          </a:ln>
+        </p:spPr>
+        <p:style>
+          <a:lnRef idx="1">
+            <a:schemeClr val="accent1"/>
+          </a:lnRef>
+          <a:fillRef idx="0">
+            <a:schemeClr val="accent1"/>
+          </a:fillRef>
+          <a:effectRef idx="0">
+            <a:schemeClr val="accent1"/>
+          </a:effectRef>
+          <a:fontRef idx="minor">
+            <a:schemeClr val="tx1"/>
+          </a:fontRef>
+        </p:style>
+      </p:cxnSp>
+      <p:cxnSp>
+        <p:nvCxnSpPr>
+          <p:cNvPr id="18" name="Straight Arrow Connector 17">
+            <a:extLst>
+              <a:ext uri="{FF2B5EF4-FFF2-40B4-BE49-F238E27FC236}">
+                <a16:creationId xmlns:a16="http://schemas.microsoft.com/office/drawing/2014/main" id="{7F0E5080-7BC5-40EB-9375-114E896FC496}"/>
+              </a:ext>
+            </a:extLst>
+          </p:cNvPr>
+          <p:cNvCxnSpPr>
+            <a:cxnSpLocks/>
+            <a:stCxn id="4" idx="2"/>
+            <a:endCxn id="7" idx="0"/>
+          </p:cNvCxnSpPr>
+          <p:nvPr/>
+        </p:nvCxnSpPr>
+        <p:spPr>
+          <a:xfrm>
+            <a:off x="6034454" y="946639"/>
+            <a:ext cx="0" cy="202224"/>
+          </a:xfrm>
+          <a:prstGeom prst="straightConnector1">
+            <a:avLst/>
+          </a:prstGeom>
+          <a:ln>
+            <a:tailEnd type="triangle"/>
+          </a:ln>
+        </p:spPr>
+        <p:style>
+          <a:lnRef idx="1">
+            <a:schemeClr val="accent1"/>
+          </a:lnRef>
+          <a:fillRef idx="0">
+            <a:schemeClr val="accent1"/>
+          </a:fillRef>
+          <a:effectRef idx="0">
+            <a:schemeClr val="accent1"/>
+          </a:effectRef>
+          <a:fontRef idx="minor">
+            <a:schemeClr val="tx1"/>
+          </a:fontRef>
+        </p:style>
+      </p:cxnSp>
+      <p:cxnSp>
+        <p:nvCxnSpPr>
+          <p:cNvPr id="22" name="Straight Arrow Connector 21">
+            <a:extLst>
+              <a:ext uri="{FF2B5EF4-FFF2-40B4-BE49-F238E27FC236}">
+                <a16:creationId xmlns:a16="http://schemas.microsoft.com/office/drawing/2014/main" id="{7BCB5CD2-05BC-4A8A-ABBA-F8355B59AE58}"/>
+              </a:ext>
+            </a:extLst>
+          </p:cNvPr>
+          <p:cNvCxnSpPr>
+            <a:cxnSpLocks/>
+            <a:stCxn id="4" idx="2"/>
+            <a:endCxn id="6" idx="0"/>
+          </p:cNvCxnSpPr>
+          <p:nvPr/>
+        </p:nvCxnSpPr>
+        <p:spPr>
+          <a:xfrm flipH="1">
+            <a:off x="4627684" y="946639"/>
+            <a:ext cx="1406770" cy="202224"/>
+          </a:xfrm>
+          <a:prstGeom prst="straightConnector1">
+            <a:avLst/>
+          </a:prstGeom>
+          <a:ln>
+            <a:tailEnd type="triangle"/>
+          </a:ln>
+        </p:spPr>
+        <p:style>
+          <a:lnRef idx="1">
+            <a:schemeClr val="accent1"/>
+          </a:lnRef>
+          <a:fillRef idx="0">
+            <a:schemeClr val="accent1"/>
+          </a:fillRef>
+          <a:effectRef idx="0">
+            <a:schemeClr val="accent1"/>
+          </a:effectRef>
+          <a:fontRef idx="minor">
+            <a:schemeClr val="tx1"/>
+          </a:fontRef>
+        </p:style>
+      </p:cxnSp>
+      <p:cxnSp>
+        <p:nvCxnSpPr>
+          <p:cNvPr id="25" name="Straight Arrow Connector 24">
+            <a:extLst>
+              <a:ext uri="{FF2B5EF4-FFF2-40B4-BE49-F238E27FC236}">
+                <a16:creationId xmlns:a16="http://schemas.microsoft.com/office/drawing/2014/main" id="{D727D45C-F147-4C85-8751-858123D893C8}"/>
+              </a:ext>
+            </a:extLst>
+          </p:cNvPr>
+          <p:cNvCxnSpPr>
+            <a:cxnSpLocks/>
+            <a:endCxn id="8" idx="0"/>
+          </p:cNvCxnSpPr>
+          <p:nvPr/>
+        </p:nvCxnSpPr>
+        <p:spPr>
+          <a:xfrm>
+            <a:off x="6034454" y="936381"/>
+            <a:ext cx="1400908" cy="212482"/>
+          </a:xfrm>
+          <a:prstGeom prst="straightConnector1">
+            <a:avLst/>
+          </a:prstGeom>
+          <a:ln>
+            <a:tailEnd type="triangle"/>
+          </a:ln>
+        </p:spPr>
+        <p:style>
+          <a:lnRef idx="1">
+            <a:schemeClr val="accent1"/>
+          </a:lnRef>
+          <a:fillRef idx="0">
+            <a:schemeClr val="accent1"/>
+          </a:fillRef>
+          <a:effectRef idx="0">
+            <a:schemeClr val="accent1"/>
+          </a:effectRef>
+          <a:fontRef idx="minor">
+            <a:schemeClr val="tx1"/>
+          </a:fontRef>
+        </p:style>
+      </p:cxnSp>
+      <p:cxnSp>
+        <p:nvCxnSpPr>
+          <p:cNvPr id="29" name="Straight Arrow Connector 28">
+            <a:extLst>
+              <a:ext uri="{FF2B5EF4-FFF2-40B4-BE49-F238E27FC236}">
+                <a16:creationId xmlns:a16="http://schemas.microsoft.com/office/drawing/2014/main" id="{C5CEE4F1-1A2C-42AF-9154-B6161BB93990}"/>
+              </a:ext>
+            </a:extLst>
+          </p:cNvPr>
+          <p:cNvCxnSpPr>
+            <a:cxnSpLocks/>
+            <a:stCxn id="8" idx="2"/>
+            <a:endCxn id="10" idx="0"/>
+          </p:cNvCxnSpPr>
+          <p:nvPr/>
+        </p:nvCxnSpPr>
+        <p:spPr>
+          <a:xfrm>
+            <a:off x="7435362" y="1740877"/>
+            <a:ext cx="1424354" cy="219809"/>
+          </a:xfrm>
+          <a:prstGeom prst="straightConnector1">
+            <a:avLst/>
+          </a:prstGeom>
+          <a:ln>
+            <a:tailEnd type="triangle"/>
+          </a:ln>
+        </p:spPr>
+        <p:style>
+          <a:lnRef idx="1">
+            <a:schemeClr val="accent1"/>
+          </a:lnRef>
+          <a:fillRef idx="0">
+            <a:schemeClr val="accent1"/>
+          </a:fillRef>
+          <a:effectRef idx="0">
+            <a:schemeClr val="accent1"/>
+          </a:effectRef>
+          <a:fontRef idx="minor">
+            <a:schemeClr val="tx1"/>
+          </a:fontRef>
+        </p:style>
+      </p:cxnSp>
+      <p:sp>
+        <p:nvSpPr>
+          <p:cNvPr id="34" name="Rectangle 33">
+            <a:extLst>
+              <a:ext uri="{FF2B5EF4-FFF2-40B4-BE49-F238E27FC236}">
+                <a16:creationId xmlns:a16="http://schemas.microsoft.com/office/drawing/2014/main" id="{DFB784B4-7AF3-4FE6-9A5F-DDB4DEDE32CB}"/>
+              </a:ext>
+            </a:extLst>
+          </p:cNvPr>
+          <p:cNvSpPr/>
+          <p:nvPr/>
+        </p:nvSpPr>
+        <p:spPr>
+          <a:xfrm>
+            <a:off x="8250019" y="1124637"/>
+            <a:ext cx="1225062" cy="592014"/>
+          </a:xfrm>
+          <a:prstGeom prst="rect">
+            <a:avLst/>
+          </a:prstGeom>
+        </p:spPr>
+        <p:style>
+          <a:lnRef idx="2">
+            <a:schemeClr val="accent1">
+              <a:shade val="50000"/>
+            </a:schemeClr>
+          </a:lnRef>
+          <a:fillRef idx="1">
+            <a:schemeClr val="accent1"/>
+          </a:fillRef>
+          <a:effectRef idx="0">
+            <a:schemeClr val="accent1"/>
+          </a:effectRef>
+          <a:fontRef idx="minor">
+            <a:schemeClr val="lt1"/>
+          </a:fontRef>
+        </p:style>
+        <p:txBody>
+          <a:bodyPr rtlCol="0" anchor="ctr"/>
+          <a:lstStyle/>
+          <a:p>
+            <a:pPr algn="ctr"/>
+            <a:r>
+              <a:rPr lang="en-GB" sz="1100" dirty="0">
+                <a:solidFill>
+                  <a:schemeClr val="tx1"/>
+                </a:solidFill>
+              </a:rPr>
+              <a:t>Financials – </a:t>
+            </a:r>
+            <a:r>
+              <a:rPr lang="en-GB" sz="1100" dirty="0" err="1">
+                <a:solidFill>
+                  <a:schemeClr val="tx1"/>
+                </a:solidFill>
+              </a:rPr>
+              <a:t>inv</a:t>
+            </a:r>
+            <a:r>
+              <a:rPr lang="en-GB" sz="1100" dirty="0">
+                <a:solidFill>
+                  <a:schemeClr val="tx1"/>
+                </a:solidFill>
+              </a:rPr>
+              <a:t> payments</a:t>
+            </a:r>
+          </a:p>
+        </p:txBody>
+      </p:sp>
+      <p:sp>
+        <p:nvSpPr>
+          <p:cNvPr id="37" name="Rectangle 36">
+            <a:extLst>
+              <a:ext uri="{FF2B5EF4-FFF2-40B4-BE49-F238E27FC236}">
+                <a16:creationId xmlns:a16="http://schemas.microsoft.com/office/drawing/2014/main" id="{325167C9-13E5-40B4-95A6-E59855982C63}"/>
+              </a:ext>
+            </a:extLst>
+          </p:cNvPr>
+          <p:cNvSpPr/>
+          <p:nvPr/>
+        </p:nvSpPr>
+        <p:spPr>
+          <a:xfrm>
+            <a:off x="4015153" y="1984912"/>
+            <a:ext cx="1225062" cy="592014"/>
+          </a:xfrm>
+          <a:prstGeom prst="rect">
+            <a:avLst/>
+          </a:prstGeom>
+        </p:spPr>
+        <p:style>
+          <a:lnRef idx="2">
+            <a:schemeClr val="accent1">
+              <a:shade val="50000"/>
+            </a:schemeClr>
+          </a:lnRef>
+          <a:fillRef idx="1">
+            <a:schemeClr val="accent1"/>
+          </a:fillRef>
+          <a:effectRef idx="0">
+            <a:schemeClr val="accent1"/>
+          </a:effectRef>
+          <a:fontRef idx="minor">
+            <a:schemeClr val="lt1"/>
+          </a:fontRef>
+        </p:style>
+        <p:txBody>
+          <a:bodyPr rtlCol="0" anchor="ctr"/>
+          <a:lstStyle/>
+          <a:p>
+            <a:pPr algn="ctr"/>
+            <a:r>
+              <a:rPr lang="en-GB" sz="1100" dirty="0">
+                <a:solidFill>
+                  <a:schemeClr val="tx1"/>
+                </a:solidFill>
+              </a:rPr>
+              <a:t>Single customer</a:t>
+            </a:r>
+          </a:p>
+        </p:txBody>
+      </p:sp>
+      <p:sp>
+        <p:nvSpPr>
+          <p:cNvPr id="38" name="Rectangle 37">
+            <a:extLst>
+              <a:ext uri="{FF2B5EF4-FFF2-40B4-BE49-F238E27FC236}">
+                <a16:creationId xmlns:a16="http://schemas.microsoft.com/office/drawing/2014/main" id="{67A80B43-D1C9-4BF8-AABF-55BE78052776}"/>
+              </a:ext>
+            </a:extLst>
+          </p:cNvPr>
+          <p:cNvSpPr/>
+          <p:nvPr/>
+        </p:nvSpPr>
+        <p:spPr>
+          <a:xfrm>
+            <a:off x="2608383" y="2836013"/>
+            <a:ext cx="1225062" cy="592014"/>
+          </a:xfrm>
+          <a:prstGeom prst="rect">
+            <a:avLst/>
+          </a:prstGeom>
+        </p:spPr>
+        <p:style>
+          <a:lnRef idx="2">
+            <a:schemeClr val="accent1">
+              <a:shade val="50000"/>
+            </a:schemeClr>
+          </a:lnRef>
+          <a:fillRef idx="1">
+            <a:schemeClr val="accent1"/>
+          </a:fillRef>
+          <a:effectRef idx="0">
+            <a:schemeClr val="accent1"/>
+          </a:effectRef>
+          <a:fontRef idx="minor">
+            <a:schemeClr val="lt1"/>
+          </a:fontRef>
+        </p:style>
+        <p:txBody>
+          <a:bodyPr rtlCol="0" anchor="ctr"/>
+          <a:lstStyle/>
+          <a:p>
+            <a:pPr algn="ctr"/>
+            <a:r>
+              <a:rPr lang="en-GB" sz="1100" dirty="0">
+                <a:solidFill>
+                  <a:schemeClr val="tx1"/>
+                </a:solidFill>
+              </a:rPr>
+              <a:t>Leads, ops, orders</a:t>
+            </a:r>
+          </a:p>
+        </p:txBody>
+      </p:sp>
+      <p:sp>
+        <p:nvSpPr>
+          <p:cNvPr id="39" name="Rectangle 38">
+            <a:extLst>
+              <a:ext uri="{FF2B5EF4-FFF2-40B4-BE49-F238E27FC236}">
+                <a16:creationId xmlns:a16="http://schemas.microsoft.com/office/drawing/2014/main" id="{08C10423-1F8B-4390-9C39-65AE701FA4AD}"/>
+              </a:ext>
+            </a:extLst>
+          </p:cNvPr>
+          <p:cNvSpPr/>
+          <p:nvPr/>
+        </p:nvSpPr>
+        <p:spPr>
+          <a:xfrm>
+            <a:off x="4015153" y="2827996"/>
+            <a:ext cx="1225062" cy="592014"/>
+          </a:xfrm>
+          <a:prstGeom prst="rect">
+            <a:avLst/>
+          </a:prstGeom>
+        </p:spPr>
+        <p:style>
+          <a:lnRef idx="2">
+            <a:schemeClr val="accent1">
+              <a:shade val="50000"/>
+            </a:schemeClr>
+          </a:lnRef>
+          <a:fillRef idx="1">
+            <a:schemeClr val="accent1"/>
+          </a:fillRef>
+          <a:effectRef idx="0">
+            <a:schemeClr val="accent1"/>
+          </a:effectRef>
+          <a:fontRef idx="minor">
+            <a:schemeClr val="lt1"/>
+          </a:fontRef>
+        </p:style>
+        <p:txBody>
+          <a:bodyPr rtlCol="0" anchor="ctr"/>
+          <a:lstStyle/>
+          <a:p>
+            <a:pPr algn="ctr"/>
+            <a:r>
+              <a:rPr lang="en-GB" sz="1100" dirty="0">
+                <a:solidFill>
+                  <a:schemeClr val="tx1"/>
+                </a:solidFill>
+              </a:rPr>
+              <a:t>Financials</a:t>
+            </a:r>
+          </a:p>
+        </p:txBody>
+      </p:sp>
+      <p:sp>
+        <p:nvSpPr>
+          <p:cNvPr id="40" name="Rectangle 39">
+            <a:extLst>
+              <a:ext uri="{FF2B5EF4-FFF2-40B4-BE49-F238E27FC236}">
+                <a16:creationId xmlns:a16="http://schemas.microsoft.com/office/drawing/2014/main" id="{8D802C06-B66D-478D-BE6D-1AEC2BAF3B67}"/>
+              </a:ext>
+            </a:extLst>
+          </p:cNvPr>
+          <p:cNvSpPr/>
+          <p:nvPr/>
+        </p:nvSpPr>
+        <p:spPr>
+          <a:xfrm>
+            <a:off x="5421923" y="2827996"/>
+            <a:ext cx="1225062" cy="592014"/>
+          </a:xfrm>
+          <a:prstGeom prst="rect">
+            <a:avLst/>
+          </a:prstGeom>
+        </p:spPr>
+        <p:style>
+          <a:lnRef idx="2">
+            <a:schemeClr val="accent1">
+              <a:shade val="50000"/>
+            </a:schemeClr>
+          </a:lnRef>
+          <a:fillRef idx="1">
+            <a:schemeClr val="accent1"/>
+          </a:fillRef>
+          <a:effectRef idx="0">
+            <a:schemeClr val="accent1"/>
+          </a:effectRef>
+          <a:fontRef idx="minor">
+            <a:schemeClr val="lt1"/>
+          </a:fontRef>
+        </p:style>
+        <p:txBody>
+          <a:bodyPr rtlCol="0" anchor="ctr"/>
+          <a:lstStyle/>
+          <a:p>
+            <a:pPr algn="ctr"/>
+            <a:r>
+              <a:rPr lang="en-GB" sz="1100" dirty="0">
+                <a:solidFill>
+                  <a:schemeClr val="tx1"/>
+                </a:solidFill>
+              </a:rPr>
+              <a:t>Communications</a:t>
+            </a:r>
+          </a:p>
+        </p:txBody>
+      </p:sp>
+      <p:sp>
+        <p:nvSpPr>
+          <p:cNvPr id="41" name="Rectangle 40">
+            <a:extLst>
+              <a:ext uri="{FF2B5EF4-FFF2-40B4-BE49-F238E27FC236}">
+                <a16:creationId xmlns:a16="http://schemas.microsoft.com/office/drawing/2014/main" id="{E866EC13-E209-4400-93CD-0DB937193A4D}"/>
+              </a:ext>
+            </a:extLst>
+          </p:cNvPr>
+          <p:cNvSpPr/>
+          <p:nvPr/>
+        </p:nvSpPr>
+        <p:spPr>
+          <a:xfrm>
+            <a:off x="1217733" y="2822724"/>
+            <a:ext cx="1225062" cy="592014"/>
+          </a:xfrm>
+          <a:prstGeom prst="rect">
+            <a:avLst/>
+          </a:prstGeom>
+        </p:spPr>
+        <p:style>
+          <a:lnRef idx="2">
+            <a:schemeClr val="accent1">
+              <a:shade val="50000"/>
+            </a:schemeClr>
+          </a:lnRef>
+          <a:fillRef idx="1">
+            <a:schemeClr val="accent1"/>
+          </a:fillRef>
+          <a:effectRef idx="0">
+            <a:schemeClr val="accent1"/>
+          </a:effectRef>
+          <a:fontRef idx="minor">
+            <a:schemeClr val="lt1"/>
+          </a:fontRef>
+        </p:style>
+        <p:txBody>
+          <a:bodyPr rtlCol="0" anchor="ctr"/>
+          <a:lstStyle/>
+          <a:p>
+            <a:pPr algn="ctr"/>
+            <a:r>
+              <a:rPr lang="en-GB" sz="1100" dirty="0">
+                <a:solidFill>
+                  <a:schemeClr val="tx1"/>
+                </a:solidFill>
+              </a:rPr>
+              <a:t>Customer dashboard + details</a:t>
+            </a:r>
+          </a:p>
+        </p:txBody>
+      </p:sp>
+      <p:cxnSp>
+        <p:nvCxnSpPr>
+          <p:cNvPr id="45" name="Straight Arrow Connector 44">
+            <a:extLst>
+              <a:ext uri="{FF2B5EF4-FFF2-40B4-BE49-F238E27FC236}">
+                <a16:creationId xmlns:a16="http://schemas.microsoft.com/office/drawing/2014/main" id="{29F88A85-ED0C-424E-AC3C-063E9EF5A031}"/>
+              </a:ext>
+            </a:extLst>
+          </p:cNvPr>
+          <p:cNvCxnSpPr>
+            <a:cxnSpLocks/>
+            <a:stCxn id="37" idx="2"/>
+            <a:endCxn id="39" idx="0"/>
+          </p:cNvCxnSpPr>
+          <p:nvPr/>
+        </p:nvCxnSpPr>
+        <p:spPr>
+          <a:xfrm>
+            <a:off x="4627684" y="2576926"/>
+            <a:ext cx="0" cy="251070"/>
+          </a:xfrm>
+          <a:prstGeom prst="straightConnector1">
+            <a:avLst/>
+          </a:prstGeom>
+          <a:ln>
+            <a:tailEnd type="triangle"/>
+          </a:ln>
+        </p:spPr>
+        <p:style>
+          <a:lnRef idx="1">
+            <a:schemeClr val="accent1"/>
+          </a:lnRef>
+          <a:fillRef idx="0">
+            <a:schemeClr val="accent1"/>
+          </a:fillRef>
+          <a:effectRef idx="0">
+            <a:schemeClr val="accent1"/>
+          </a:effectRef>
+          <a:fontRef idx="minor">
+            <a:schemeClr val="tx1"/>
+          </a:fontRef>
+        </p:style>
+      </p:cxnSp>
+      <p:cxnSp>
+        <p:nvCxnSpPr>
+          <p:cNvPr id="47" name="Straight Arrow Connector 46">
+            <a:extLst>
+              <a:ext uri="{FF2B5EF4-FFF2-40B4-BE49-F238E27FC236}">
+                <a16:creationId xmlns:a16="http://schemas.microsoft.com/office/drawing/2014/main" id="{52742B95-A6AC-4513-B20C-1B83BA4EAABB}"/>
+              </a:ext>
+            </a:extLst>
+          </p:cNvPr>
+          <p:cNvCxnSpPr>
+            <a:cxnSpLocks/>
+            <a:stCxn id="37" idx="2"/>
+            <a:endCxn id="41" idx="0"/>
+          </p:cNvCxnSpPr>
+          <p:nvPr/>
+        </p:nvCxnSpPr>
+        <p:spPr>
+          <a:xfrm flipH="1">
+            <a:off x="1830264" y="2576926"/>
+            <a:ext cx="2797420" cy="245798"/>
+          </a:xfrm>
+          <a:prstGeom prst="straightConnector1">
+            <a:avLst/>
+          </a:prstGeom>
+          <a:ln>
+            <a:tailEnd type="triangle"/>
+          </a:ln>
+        </p:spPr>
+        <p:style>
+          <a:lnRef idx="1">
+            <a:schemeClr val="accent1"/>
+          </a:lnRef>
+          <a:fillRef idx="0">
+            <a:schemeClr val="accent1"/>
+          </a:fillRef>
+          <a:effectRef idx="0">
+            <a:schemeClr val="accent1"/>
+          </a:effectRef>
+          <a:fontRef idx="minor">
+            <a:schemeClr val="tx1"/>
+          </a:fontRef>
+        </p:style>
+      </p:cxnSp>
+      <p:cxnSp>
+        <p:nvCxnSpPr>
+          <p:cNvPr id="48" name="Straight Arrow Connector 47">
+            <a:extLst>
+              <a:ext uri="{FF2B5EF4-FFF2-40B4-BE49-F238E27FC236}">
+                <a16:creationId xmlns:a16="http://schemas.microsoft.com/office/drawing/2014/main" id="{70611BFD-4CB0-4641-9E0E-1070E3AFFEF6}"/>
+              </a:ext>
+            </a:extLst>
+          </p:cNvPr>
+          <p:cNvCxnSpPr>
+            <a:cxnSpLocks/>
+            <a:stCxn id="37" idx="2"/>
+            <a:endCxn id="38" idx="0"/>
+          </p:cNvCxnSpPr>
+          <p:nvPr/>
+        </p:nvCxnSpPr>
+        <p:spPr>
+          <a:xfrm flipH="1">
+            <a:off x="3220914" y="2576926"/>
+            <a:ext cx="1406770" cy="259087"/>
+          </a:xfrm>
+          <a:prstGeom prst="straightConnector1">
+            <a:avLst/>
+          </a:prstGeom>
+          <a:ln>
+            <a:tailEnd type="triangle"/>
+          </a:ln>
+        </p:spPr>
+        <p:style>
+          <a:lnRef idx="1">
+            <a:schemeClr val="accent1"/>
+          </a:lnRef>
+          <a:fillRef idx="0">
+            <a:schemeClr val="accent1"/>
+          </a:fillRef>
+          <a:effectRef idx="0">
+            <a:schemeClr val="accent1"/>
+          </a:effectRef>
+          <a:fontRef idx="minor">
+            <a:schemeClr val="tx1"/>
+          </a:fontRef>
+        </p:style>
+      </p:cxnSp>
+      <p:cxnSp>
+        <p:nvCxnSpPr>
+          <p:cNvPr id="49" name="Straight Arrow Connector 48">
+            <a:extLst>
+              <a:ext uri="{FF2B5EF4-FFF2-40B4-BE49-F238E27FC236}">
+                <a16:creationId xmlns:a16="http://schemas.microsoft.com/office/drawing/2014/main" id="{7546C30A-CFD0-4E9A-903D-68D889C139AB}"/>
+              </a:ext>
+            </a:extLst>
+          </p:cNvPr>
+          <p:cNvCxnSpPr>
+            <a:cxnSpLocks/>
+            <a:stCxn id="37" idx="2"/>
+            <a:endCxn id="67" idx="0"/>
+          </p:cNvCxnSpPr>
+          <p:nvPr/>
+        </p:nvCxnSpPr>
+        <p:spPr>
+          <a:xfrm>
+            <a:off x="4627684" y="2576926"/>
+            <a:ext cx="2820818" cy="251070"/>
+          </a:xfrm>
+          <a:prstGeom prst="straightConnector1">
+            <a:avLst/>
+          </a:prstGeom>
+          <a:ln>
+            <a:tailEnd type="triangle"/>
+          </a:ln>
+        </p:spPr>
+        <p:style>
+          <a:lnRef idx="1">
+            <a:schemeClr val="accent1"/>
+          </a:lnRef>
+          <a:fillRef idx="0">
+            <a:schemeClr val="accent1"/>
+          </a:fillRef>
+          <a:effectRef idx="0">
+            <a:schemeClr val="accent1"/>
+          </a:effectRef>
+          <a:fontRef idx="minor">
+            <a:schemeClr val="tx1"/>
+          </a:fontRef>
+        </p:style>
+      </p:cxnSp>
+      <p:cxnSp>
+        <p:nvCxnSpPr>
+          <p:cNvPr id="51" name="Straight Arrow Connector 50">
+            <a:extLst>
+              <a:ext uri="{FF2B5EF4-FFF2-40B4-BE49-F238E27FC236}">
+                <a16:creationId xmlns:a16="http://schemas.microsoft.com/office/drawing/2014/main" id="{6FE15D35-09B7-4328-993C-D50437460751}"/>
+              </a:ext>
+            </a:extLst>
+          </p:cNvPr>
+          <p:cNvCxnSpPr>
+            <a:cxnSpLocks/>
+            <a:stCxn id="37" idx="2"/>
+            <a:endCxn id="40" idx="0"/>
+          </p:cNvCxnSpPr>
+          <p:nvPr/>
+        </p:nvCxnSpPr>
+        <p:spPr>
+          <a:xfrm>
+            <a:off x="4627684" y="2576926"/>
+            <a:ext cx="1406770" cy="251070"/>
+          </a:xfrm>
+          <a:prstGeom prst="straightConnector1">
+            <a:avLst/>
+          </a:prstGeom>
+          <a:ln>
+            <a:tailEnd type="triangle"/>
+          </a:ln>
+        </p:spPr>
+        <p:style>
+          <a:lnRef idx="1">
+            <a:schemeClr val="accent1"/>
+          </a:lnRef>
+          <a:fillRef idx="0">
+            <a:schemeClr val="accent1"/>
+          </a:fillRef>
+          <a:effectRef idx="0">
+            <a:schemeClr val="accent1"/>
+          </a:effectRef>
+          <a:fontRef idx="minor">
+            <a:schemeClr val="tx1"/>
+          </a:fontRef>
+        </p:style>
+      </p:cxnSp>
+      <p:cxnSp>
+        <p:nvCxnSpPr>
+          <p:cNvPr id="53" name="Straight Arrow Connector 52">
+            <a:extLst>
+              <a:ext uri="{FF2B5EF4-FFF2-40B4-BE49-F238E27FC236}">
+                <a16:creationId xmlns:a16="http://schemas.microsoft.com/office/drawing/2014/main" id="{67CBFC27-0E4B-4C8B-A2CC-D054FB92B3BF}"/>
+              </a:ext>
+            </a:extLst>
+          </p:cNvPr>
+          <p:cNvCxnSpPr>
+            <a:cxnSpLocks/>
+            <a:stCxn id="6" idx="2"/>
+            <a:endCxn id="37" idx="0"/>
+          </p:cNvCxnSpPr>
+          <p:nvPr/>
+        </p:nvCxnSpPr>
+        <p:spPr>
+          <a:xfrm>
+            <a:off x="4627684" y="1740877"/>
+            <a:ext cx="0" cy="244035"/>
+          </a:xfrm>
+          <a:prstGeom prst="straightConnector1">
+            <a:avLst/>
+          </a:prstGeom>
+          <a:ln>
+            <a:tailEnd type="triangle"/>
+          </a:ln>
+        </p:spPr>
+        <p:style>
+          <a:lnRef idx="1">
+            <a:schemeClr val="accent1"/>
+          </a:lnRef>
+          <a:fillRef idx="0">
+            <a:schemeClr val="accent1"/>
+          </a:fillRef>
+          <a:effectRef idx="0">
+            <a:schemeClr val="accent1"/>
+          </a:effectRef>
+          <a:fontRef idx="minor">
+            <a:schemeClr val="tx1"/>
+          </a:fontRef>
+        </p:style>
+      </p:cxnSp>
+      <p:sp>
+        <p:nvSpPr>
+          <p:cNvPr id="67" name="Rectangle 66">
+            <a:extLst>
+              <a:ext uri="{FF2B5EF4-FFF2-40B4-BE49-F238E27FC236}">
+                <a16:creationId xmlns:a16="http://schemas.microsoft.com/office/drawing/2014/main" id="{312023BF-FB33-454A-838E-52063FDE7B97}"/>
+              </a:ext>
+            </a:extLst>
+          </p:cNvPr>
+          <p:cNvSpPr/>
+          <p:nvPr/>
+        </p:nvSpPr>
+        <p:spPr>
+          <a:xfrm>
+            <a:off x="6835971" y="2827996"/>
+            <a:ext cx="1225062" cy="592014"/>
+          </a:xfrm>
+          <a:prstGeom prst="rect">
+            <a:avLst/>
+          </a:prstGeom>
+        </p:spPr>
+        <p:style>
+          <a:lnRef idx="2">
+            <a:schemeClr val="accent1">
+              <a:shade val="50000"/>
+            </a:schemeClr>
+          </a:lnRef>
+          <a:fillRef idx="1">
+            <a:schemeClr val="accent1"/>
+          </a:fillRef>
+          <a:effectRef idx="0">
+            <a:schemeClr val="accent1"/>
+          </a:effectRef>
+          <a:fontRef idx="minor">
+            <a:schemeClr val="lt1"/>
+          </a:fontRef>
+        </p:style>
+        <p:txBody>
+          <a:bodyPr rtlCol="0" anchor="ctr"/>
+          <a:lstStyle/>
+          <a:p>
+            <a:pPr algn="ctr"/>
+            <a:r>
+              <a:rPr lang="en-GB" sz="1100" dirty="0">
+                <a:solidFill>
+                  <a:schemeClr val="tx1"/>
+                </a:solidFill>
+              </a:rPr>
+              <a:t>Customer main codes</a:t>
+            </a:r>
+          </a:p>
+        </p:txBody>
+      </p:sp>
+      <p:sp>
+        <p:nvSpPr>
+          <p:cNvPr id="71" name="Rectangle 70">
+            <a:extLst>
+              <a:ext uri="{FF2B5EF4-FFF2-40B4-BE49-F238E27FC236}">
+                <a16:creationId xmlns:a16="http://schemas.microsoft.com/office/drawing/2014/main" id="{7C231200-B25E-4404-B6BA-4E4600F2C008}"/>
+              </a:ext>
+            </a:extLst>
+          </p:cNvPr>
+          <p:cNvSpPr/>
+          <p:nvPr/>
+        </p:nvSpPr>
+        <p:spPr>
+          <a:xfrm>
+            <a:off x="6822831" y="3640796"/>
+            <a:ext cx="1225062" cy="592014"/>
+          </a:xfrm>
+          <a:prstGeom prst="rect">
+            <a:avLst/>
+          </a:prstGeom>
+        </p:spPr>
+        <p:style>
+          <a:lnRef idx="2">
+            <a:schemeClr val="accent1">
+              <a:shade val="50000"/>
+            </a:schemeClr>
+          </a:lnRef>
+          <a:fillRef idx="1">
+            <a:schemeClr val="accent1"/>
+          </a:fillRef>
+          <a:effectRef idx="0">
+            <a:schemeClr val="accent1"/>
+          </a:effectRef>
+          <a:fontRef idx="minor">
+            <a:schemeClr val="lt1"/>
+          </a:fontRef>
+        </p:style>
+        <p:txBody>
+          <a:bodyPr rtlCol="0" anchor="ctr"/>
+          <a:lstStyle/>
+          <a:p>
+            <a:pPr algn="ctr"/>
+            <a:r>
+              <a:rPr lang="en-GB" sz="1100" dirty="0">
+                <a:solidFill>
+                  <a:schemeClr val="tx1"/>
+                </a:solidFill>
+              </a:rPr>
+              <a:t>Main code</a:t>
+            </a:r>
+          </a:p>
+        </p:txBody>
+      </p:sp>
+      <p:cxnSp>
+        <p:nvCxnSpPr>
+          <p:cNvPr id="72" name="Straight Arrow Connector 71">
+            <a:extLst>
+              <a:ext uri="{FF2B5EF4-FFF2-40B4-BE49-F238E27FC236}">
+                <a16:creationId xmlns:a16="http://schemas.microsoft.com/office/drawing/2014/main" id="{EE68FE7E-AB76-4902-B4FF-1A98510E8F07}"/>
+              </a:ext>
+            </a:extLst>
+          </p:cNvPr>
+          <p:cNvCxnSpPr>
+            <a:cxnSpLocks/>
+            <a:stCxn id="71" idx="2"/>
+            <a:endCxn id="78" idx="0"/>
+          </p:cNvCxnSpPr>
+          <p:nvPr/>
+        </p:nvCxnSpPr>
+        <p:spPr>
+          <a:xfrm flipH="1">
+            <a:off x="6034454" y="4232810"/>
+            <a:ext cx="1400908" cy="183661"/>
+          </a:xfrm>
+          <a:prstGeom prst="straightConnector1">
+            <a:avLst/>
+          </a:prstGeom>
+          <a:ln>
+            <a:tailEnd type="triangle"/>
+          </a:ln>
+        </p:spPr>
+        <p:style>
+          <a:lnRef idx="1">
+            <a:schemeClr val="accent1"/>
+          </a:lnRef>
+          <a:fillRef idx="0">
+            <a:schemeClr val="accent1"/>
+          </a:fillRef>
+          <a:effectRef idx="0">
+            <a:schemeClr val="accent1"/>
+          </a:effectRef>
+          <a:fontRef idx="minor">
+            <a:schemeClr val="tx1"/>
+          </a:fontRef>
+        </p:style>
+      </p:cxnSp>
+      <p:cxnSp>
+        <p:nvCxnSpPr>
+          <p:cNvPr id="73" name="Straight Arrow Connector 72">
+            <a:extLst>
+              <a:ext uri="{FF2B5EF4-FFF2-40B4-BE49-F238E27FC236}">
+                <a16:creationId xmlns:a16="http://schemas.microsoft.com/office/drawing/2014/main" id="{E8F781D6-43D2-4F5A-A61A-DB5E6B45E587}"/>
+              </a:ext>
+            </a:extLst>
+          </p:cNvPr>
+          <p:cNvCxnSpPr>
+            <a:cxnSpLocks/>
+            <a:stCxn id="71" idx="2"/>
+            <a:endCxn id="77" idx="0"/>
+          </p:cNvCxnSpPr>
+          <p:nvPr/>
+        </p:nvCxnSpPr>
+        <p:spPr>
+          <a:xfrm>
+            <a:off x="7435362" y="4232810"/>
+            <a:ext cx="13140" cy="183661"/>
+          </a:xfrm>
+          <a:prstGeom prst="straightConnector1">
+            <a:avLst/>
+          </a:prstGeom>
+          <a:ln>
+            <a:tailEnd type="triangle"/>
+          </a:ln>
+        </p:spPr>
+        <p:style>
+          <a:lnRef idx="1">
+            <a:schemeClr val="accent1"/>
+          </a:lnRef>
+          <a:fillRef idx="0">
+            <a:schemeClr val="accent1"/>
+          </a:fillRef>
+          <a:effectRef idx="0">
+            <a:schemeClr val="accent1"/>
+          </a:effectRef>
+          <a:fontRef idx="minor">
+            <a:schemeClr val="tx1"/>
+          </a:fontRef>
+        </p:style>
+      </p:cxnSp>
+      <p:cxnSp>
+        <p:nvCxnSpPr>
+          <p:cNvPr id="74" name="Straight Arrow Connector 73">
+            <a:extLst>
+              <a:ext uri="{FF2B5EF4-FFF2-40B4-BE49-F238E27FC236}">
+                <a16:creationId xmlns:a16="http://schemas.microsoft.com/office/drawing/2014/main" id="{5CFA94A1-1C96-4FCA-AA57-B28973EA93C1}"/>
+              </a:ext>
+            </a:extLst>
+          </p:cNvPr>
+          <p:cNvCxnSpPr>
+            <a:cxnSpLocks/>
+            <a:stCxn id="67" idx="2"/>
+            <a:endCxn id="71" idx="0"/>
+          </p:cNvCxnSpPr>
+          <p:nvPr/>
+        </p:nvCxnSpPr>
+        <p:spPr>
+          <a:xfrm flipH="1">
+            <a:off x="7435362" y="3420010"/>
+            <a:ext cx="13140" cy="220786"/>
+          </a:xfrm>
+          <a:prstGeom prst="straightConnector1">
+            <a:avLst/>
+          </a:prstGeom>
+          <a:ln>
+            <a:tailEnd type="triangle"/>
+          </a:ln>
+        </p:spPr>
+        <p:style>
+          <a:lnRef idx="1">
+            <a:schemeClr val="accent1"/>
+          </a:lnRef>
+          <a:fillRef idx="0">
+            <a:schemeClr val="accent1"/>
+          </a:fillRef>
+          <a:effectRef idx="0">
+            <a:schemeClr val="accent1"/>
+          </a:effectRef>
+          <a:fontRef idx="minor">
+            <a:schemeClr val="tx1"/>
+          </a:fontRef>
+        </p:style>
+      </p:cxnSp>
+      <p:sp>
+        <p:nvSpPr>
+          <p:cNvPr id="77" name="Rectangle 76">
+            <a:extLst>
+              <a:ext uri="{FF2B5EF4-FFF2-40B4-BE49-F238E27FC236}">
+                <a16:creationId xmlns:a16="http://schemas.microsoft.com/office/drawing/2014/main" id="{E2CCA341-C3B7-48A5-9501-84412FEEBD24}"/>
+              </a:ext>
+            </a:extLst>
+          </p:cNvPr>
+          <p:cNvSpPr/>
+          <p:nvPr/>
+        </p:nvSpPr>
+        <p:spPr>
+          <a:xfrm>
+            <a:off x="6835971" y="4416471"/>
+            <a:ext cx="1225062" cy="592014"/>
+          </a:xfrm>
+          <a:prstGeom prst="rect">
+            <a:avLst/>
+          </a:prstGeom>
+        </p:spPr>
+        <p:style>
+          <a:lnRef idx="2">
+            <a:schemeClr val="accent1">
+              <a:shade val="50000"/>
+            </a:schemeClr>
+          </a:lnRef>
+          <a:fillRef idx="1">
+            <a:schemeClr val="accent1"/>
+          </a:fillRef>
+          <a:effectRef idx="0">
+            <a:schemeClr val="accent1"/>
+          </a:effectRef>
+          <a:fontRef idx="minor">
+            <a:schemeClr val="lt1"/>
+          </a:fontRef>
+        </p:style>
+        <p:txBody>
+          <a:bodyPr rtlCol="0" anchor="ctr"/>
+          <a:lstStyle/>
+          <a:p>
+            <a:pPr algn="ctr"/>
+            <a:r>
+              <a:rPr lang="en-GB" sz="1100" dirty="0">
+                <a:solidFill>
+                  <a:schemeClr val="tx1"/>
+                </a:solidFill>
+              </a:rPr>
+              <a:t>Teams – AM PM</a:t>
+            </a:r>
+          </a:p>
+        </p:txBody>
+      </p:sp>
+      <p:sp>
+        <p:nvSpPr>
+          <p:cNvPr id="78" name="Rectangle 77">
+            <a:extLst>
+              <a:ext uri="{FF2B5EF4-FFF2-40B4-BE49-F238E27FC236}">
+                <a16:creationId xmlns:a16="http://schemas.microsoft.com/office/drawing/2014/main" id="{F4D5E182-5F28-44CC-B835-7BF0E743E7C3}"/>
+              </a:ext>
+            </a:extLst>
+          </p:cNvPr>
+          <p:cNvSpPr/>
+          <p:nvPr/>
+        </p:nvSpPr>
+        <p:spPr>
+          <a:xfrm>
+            <a:off x="5421923" y="4416471"/>
+            <a:ext cx="1225062" cy="592014"/>
+          </a:xfrm>
+          <a:prstGeom prst="rect">
+            <a:avLst/>
+          </a:prstGeom>
+        </p:spPr>
+        <p:style>
+          <a:lnRef idx="2">
+            <a:schemeClr val="accent1">
+              <a:shade val="50000"/>
+            </a:schemeClr>
+          </a:lnRef>
+          <a:fillRef idx="1">
+            <a:schemeClr val="accent1"/>
+          </a:fillRef>
+          <a:effectRef idx="0">
+            <a:schemeClr val="accent1"/>
+          </a:effectRef>
+          <a:fontRef idx="minor">
+            <a:schemeClr val="lt1"/>
+          </a:fontRef>
+        </p:style>
+        <p:txBody>
+          <a:bodyPr rtlCol="0" anchor="ctr"/>
+          <a:lstStyle/>
+          <a:p>
+            <a:pPr algn="ctr"/>
+            <a:r>
+              <a:rPr lang="en-GB" sz="1100" dirty="0">
+                <a:solidFill>
+                  <a:schemeClr val="tx1"/>
+                </a:solidFill>
+              </a:rPr>
+              <a:t>FP - materials</a:t>
+            </a:r>
+          </a:p>
+        </p:txBody>
+      </p:sp>
+      <p:sp>
+        <p:nvSpPr>
+          <p:cNvPr id="84" name="Rectangle 83">
+            <a:extLst>
+              <a:ext uri="{FF2B5EF4-FFF2-40B4-BE49-F238E27FC236}">
+                <a16:creationId xmlns:a16="http://schemas.microsoft.com/office/drawing/2014/main" id="{6B6CFA80-4E88-445E-879B-97B50E2DCD05}"/>
+              </a:ext>
+            </a:extLst>
+          </p:cNvPr>
+          <p:cNvSpPr/>
+          <p:nvPr/>
+        </p:nvSpPr>
+        <p:spPr>
+          <a:xfrm>
+            <a:off x="8250019" y="4416471"/>
+            <a:ext cx="1225062" cy="592014"/>
+          </a:xfrm>
+          <a:prstGeom prst="rect">
+            <a:avLst/>
+          </a:prstGeom>
+        </p:spPr>
+        <p:style>
+          <a:lnRef idx="2">
+            <a:schemeClr val="accent1">
+              <a:shade val="50000"/>
+            </a:schemeClr>
+          </a:lnRef>
+          <a:fillRef idx="1">
+            <a:schemeClr val="accent1"/>
+          </a:fillRef>
+          <a:effectRef idx="0">
+            <a:schemeClr val="accent1"/>
+          </a:effectRef>
+          <a:fontRef idx="minor">
+            <a:schemeClr val="lt1"/>
+          </a:fontRef>
+        </p:style>
+        <p:txBody>
+          <a:bodyPr rtlCol="0" anchor="ctr"/>
+          <a:lstStyle/>
+          <a:p>
+            <a:pPr algn="ctr"/>
+            <a:r>
+              <a:rPr lang="en-GB" sz="1100" dirty="0">
+                <a:solidFill>
+                  <a:schemeClr val="tx1"/>
+                </a:solidFill>
+              </a:rPr>
+              <a:t>Communications</a:t>
+            </a:r>
+          </a:p>
+        </p:txBody>
+      </p:sp>
+      <p:cxnSp>
+        <p:nvCxnSpPr>
+          <p:cNvPr id="87" name="Straight Arrow Connector 86">
+            <a:extLst>
+              <a:ext uri="{FF2B5EF4-FFF2-40B4-BE49-F238E27FC236}">
+                <a16:creationId xmlns:a16="http://schemas.microsoft.com/office/drawing/2014/main" id="{64753A00-11F9-4323-BD83-FC29E737306D}"/>
+              </a:ext>
+            </a:extLst>
+          </p:cNvPr>
+          <p:cNvCxnSpPr>
+            <a:cxnSpLocks/>
+            <a:stCxn id="78" idx="2"/>
+            <a:endCxn id="93" idx="0"/>
+          </p:cNvCxnSpPr>
+          <p:nvPr/>
+        </p:nvCxnSpPr>
+        <p:spPr>
+          <a:xfrm>
+            <a:off x="6034454" y="5008485"/>
+            <a:ext cx="0" cy="191969"/>
+          </a:xfrm>
+          <a:prstGeom prst="straightConnector1">
+            <a:avLst/>
+          </a:prstGeom>
+          <a:ln>
+            <a:tailEnd type="triangle"/>
+          </a:ln>
+        </p:spPr>
+        <p:style>
+          <a:lnRef idx="1">
+            <a:schemeClr val="accent1"/>
+          </a:lnRef>
+          <a:fillRef idx="0">
+            <a:schemeClr val="accent1"/>
+          </a:fillRef>
+          <a:effectRef idx="0">
+            <a:schemeClr val="accent1"/>
+          </a:effectRef>
+          <a:fontRef idx="minor">
+            <a:schemeClr val="tx1"/>
+          </a:fontRef>
+        </p:style>
+      </p:cxnSp>
+      <p:cxnSp>
+        <p:nvCxnSpPr>
+          <p:cNvPr id="88" name="Straight Arrow Connector 87">
+            <a:extLst>
+              <a:ext uri="{FF2B5EF4-FFF2-40B4-BE49-F238E27FC236}">
+                <a16:creationId xmlns:a16="http://schemas.microsoft.com/office/drawing/2014/main" id="{B414E240-4A65-416B-9BC3-412DAFEB03A8}"/>
+              </a:ext>
+            </a:extLst>
+          </p:cNvPr>
+          <p:cNvCxnSpPr>
+            <a:cxnSpLocks/>
+            <a:stCxn id="71" idx="2"/>
+            <a:endCxn id="84" idx="0"/>
+          </p:cNvCxnSpPr>
+          <p:nvPr/>
+        </p:nvCxnSpPr>
+        <p:spPr>
+          <a:xfrm>
+            <a:off x="7435362" y="4232810"/>
+            <a:ext cx="1427188" cy="183661"/>
+          </a:xfrm>
+          <a:prstGeom prst="straightConnector1">
+            <a:avLst/>
+          </a:prstGeom>
+          <a:ln>
+            <a:tailEnd type="triangle"/>
+          </a:ln>
+        </p:spPr>
+        <p:style>
+          <a:lnRef idx="1">
+            <a:schemeClr val="accent1"/>
+          </a:lnRef>
+          <a:fillRef idx="0">
+            <a:schemeClr val="accent1"/>
+          </a:fillRef>
+          <a:effectRef idx="0">
+            <a:schemeClr val="accent1"/>
+          </a:effectRef>
+          <a:fontRef idx="minor">
+            <a:schemeClr val="tx1"/>
+          </a:fontRef>
+        </p:style>
+      </p:cxnSp>
+      <p:sp>
+        <p:nvSpPr>
+          <p:cNvPr id="93" name="Rectangle 92">
+            <a:extLst>
+              <a:ext uri="{FF2B5EF4-FFF2-40B4-BE49-F238E27FC236}">
+                <a16:creationId xmlns:a16="http://schemas.microsoft.com/office/drawing/2014/main" id="{A2F6ED7C-FC75-446C-A74D-4AACAFDE2AFE}"/>
+              </a:ext>
+            </a:extLst>
+          </p:cNvPr>
+          <p:cNvSpPr/>
+          <p:nvPr/>
+        </p:nvSpPr>
+        <p:spPr>
+          <a:xfrm>
+            <a:off x="5421923" y="5200454"/>
+            <a:ext cx="1225062" cy="592014"/>
+          </a:xfrm>
+          <a:prstGeom prst="rect">
+            <a:avLst/>
+          </a:prstGeom>
+        </p:spPr>
+        <p:style>
+          <a:lnRef idx="2">
+            <a:schemeClr val="accent1">
+              <a:shade val="50000"/>
+            </a:schemeClr>
+          </a:lnRef>
+          <a:fillRef idx="1">
+            <a:schemeClr val="accent1"/>
+          </a:fillRef>
+          <a:effectRef idx="0">
+            <a:schemeClr val="accent1"/>
+          </a:effectRef>
+          <a:fontRef idx="minor">
+            <a:schemeClr val="lt1"/>
+          </a:fontRef>
+        </p:style>
+        <p:txBody>
+          <a:bodyPr rtlCol="0" anchor="ctr"/>
+          <a:lstStyle/>
+          <a:p>
+            <a:pPr algn="ctr"/>
+            <a:r>
+              <a:rPr lang="en-GB" sz="1100" dirty="0">
+                <a:solidFill>
+                  <a:schemeClr val="tx1"/>
+                </a:solidFill>
+              </a:rPr>
+              <a:t>Batches</a:t>
+            </a:r>
+          </a:p>
+        </p:txBody>
+      </p:sp>
+      <p:sp>
+        <p:nvSpPr>
+          <p:cNvPr id="94" name="Rectangle 93">
+            <a:extLst>
+              <a:ext uri="{FF2B5EF4-FFF2-40B4-BE49-F238E27FC236}">
+                <a16:creationId xmlns:a16="http://schemas.microsoft.com/office/drawing/2014/main" id="{2F006002-AFAE-4918-821F-7E5E3C941FFD}"/>
+              </a:ext>
+            </a:extLst>
+          </p:cNvPr>
+          <p:cNvSpPr/>
+          <p:nvPr/>
+        </p:nvSpPr>
+        <p:spPr>
+          <a:xfrm>
+            <a:off x="4015153" y="5200454"/>
+            <a:ext cx="1225062" cy="592014"/>
+          </a:xfrm>
+          <a:prstGeom prst="rect">
+            <a:avLst/>
+          </a:prstGeom>
+        </p:spPr>
+        <p:style>
+          <a:lnRef idx="2">
+            <a:schemeClr val="accent1">
+              <a:shade val="50000"/>
+            </a:schemeClr>
+          </a:lnRef>
+          <a:fillRef idx="1">
+            <a:schemeClr val="accent1"/>
+          </a:fillRef>
+          <a:effectRef idx="0">
+            <a:schemeClr val="accent1"/>
+          </a:effectRef>
+          <a:fontRef idx="minor">
+            <a:schemeClr val="lt1"/>
+          </a:fontRef>
+        </p:style>
+        <p:txBody>
+          <a:bodyPr rtlCol="0" anchor="ctr"/>
+          <a:lstStyle/>
+          <a:p>
+            <a:pPr algn="ctr"/>
+            <a:r>
+              <a:rPr lang="en-GB" sz="1100" dirty="0">
+                <a:solidFill>
+                  <a:schemeClr val="tx1"/>
+                </a:solidFill>
+              </a:rPr>
+              <a:t>Material Dash</a:t>
+            </a:r>
+          </a:p>
+        </p:txBody>
+      </p:sp>
+      <p:sp>
+        <p:nvSpPr>
+          <p:cNvPr id="95" name="Rectangle 94">
+            <a:extLst>
+              <a:ext uri="{FF2B5EF4-FFF2-40B4-BE49-F238E27FC236}">
+                <a16:creationId xmlns:a16="http://schemas.microsoft.com/office/drawing/2014/main" id="{371D25F0-7B68-4690-BEBB-1D20FC6C07AF}"/>
+              </a:ext>
+            </a:extLst>
+          </p:cNvPr>
+          <p:cNvSpPr/>
+          <p:nvPr/>
+        </p:nvSpPr>
+        <p:spPr>
+          <a:xfrm>
+            <a:off x="6822831" y="5190196"/>
+            <a:ext cx="1225062" cy="592014"/>
+          </a:xfrm>
+          <a:prstGeom prst="rect">
+            <a:avLst/>
+          </a:prstGeom>
+        </p:spPr>
+        <p:style>
+          <a:lnRef idx="2">
+            <a:schemeClr val="accent1">
+              <a:shade val="50000"/>
+            </a:schemeClr>
+          </a:lnRef>
+          <a:fillRef idx="1">
+            <a:schemeClr val="accent1"/>
+          </a:fillRef>
+          <a:effectRef idx="0">
+            <a:schemeClr val="accent1"/>
+          </a:effectRef>
+          <a:fontRef idx="minor">
+            <a:schemeClr val="lt1"/>
+          </a:fontRef>
+        </p:style>
+        <p:txBody>
+          <a:bodyPr rtlCol="0" anchor="ctr"/>
+          <a:lstStyle/>
+          <a:p>
+            <a:pPr algn="ctr"/>
+            <a:r>
+              <a:rPr lang="en-GB" sz="1100" dirty="0">
+                <a:solidFill>
+                  <a:schemeClr val="tx1"/>
+                </a:solidFill>
+              </a:rPr>
+              <a:t>Communications</a:t>
+            </a:r>
+          </a:p>
+        </p:txBody>
+      </p:sp>
+      <p:cxnSp>
+        <p:nvCxnSpPr>
+          <p:cNvPr id="100" name="Straight Arrow Connector 99">
+            <a:extLst>
+              <a:ext uri="{FF2B5EF4-FFF2-40B4-BE49-F238E27FC236}">
+                <a16:creationId xmlns:a16="http://schemas.microsoft.com/office/drawing/2014/main" id="{9ECBF98E-14F1-437B-8D3C-AEDD05F0C9A6}"/>
+              </a:ext>
+            </a:extLst>
+          </p:cNvPr>
+          <p:cNvCxnSpPr>
+            <a:cxnSpLocks/>
+            <a:stCxn id="78" idx="2"/>
+            <a:endCxn id="94" idx="0"/>
+          </p:cNvCxnSpPr>
+          <p:nvPr/>
+        </p:nvCxnSpPr>
+        <p:spPr>
+          <a:xfrm flipH="1">
+            <a:off x="4627684" y="5008485"/>
+            <a:ext cx="1406770" cy="191969"/>
+          </a:xfrm>
+          <a:prstGeom prst="straightConnector1">
+            <a:avLst/>
+          </a:prstGeom>
+          <a:ln>
+            <a:tailEnd type="triangle"/>
+          </a:ln>
+        </p:spPr>
+        <p:style>
+          <a:lnRef idx="1">
+            <a:schemeClr val="accent1"/>
+          </a:lnRef>
+          <a:fillRef idx="0">
+            <a:schemeClr val="accent1"/>
+          </a:fillRef>
+          <a:effectRef idx="0">
+            <a:schemeClr val="accent1"/>
+          </a:effectRef>
+          <a:fontRef idx="minor">
+            <a:schemeClr val="tx1"/>
+          </a:fontRef>
+        </p:style>
+      </p:cxnSp>
+      <p:cxnSp>
+        <p:nvCxnSpPr>
+          <p:cNvPr id="103" name="Straight Arrow Connector 102">
+            <a:extLst>
+              <a:ext uri="{FF2B5EF4-FFF2-40B4-BE49-F238E27FC236}">
+                <a16:creationId xmlns:a16="http://schemas.microsoft.com/office/drawing/2014/main" id="{165A96E7-6B8C-4E70-8729-49E4D4C97C67}"/>
+              </a:ext>
+            </a:extLst>
+          </p:cNvPr>
+          <p:cNvCxnSpPr>
+            <a:cxnSpLocks/>
+            <a:stCxn id="78" idx="2"/>
+            <a:endCxn id="95" idx="0"/>
+          </p:cNvCxnSpPr>
+          <p:nvPr/>
+        </p:nvCxnSpPr>
+        <p:spPr>
+          <a:xfrm>
+            <a:off x="6034454" y="5008485"/>
+            <a:ext cx="1400908" cy="181711"/>
+          </a:xfrm>
+          <a:prstGeom prst="straightConnector1">
+            <a:avLst/>
+          </a:prstGeom>
+          <a:ln>
+            <a:tailEnd type="triangle"/>
+          </a:ln>
+        </p:spPr>
+        <p:style>
+          <a:lnRef idx="1">
+            <a:schemeClr val="accent1"/>
+          </a:lnRef>
+          <a:fillRef idx="0">
+            <a:schemeClr val="accent1"/>
+          </a:fillRef>
+          <a:effectRef idx="0">
+            <a:schemeClr val="accent1"/>
+          </a:effectRef>
+          <a:fontRef idx="minor">
+            <a:schemeClr val="tx1"/>
+          </a:fontRef>
+        </p:style>
+      </p:cxnSp>
+    </p:spTree>
+    <p:extLst>
+      <p:ext uri="{BB962C8B-B14F-4D97-AF65-F5344CB8AC3E}">
+        <p14:creationId xmlns:p14="http://schemas.microsoft.com/office/powerpoint/2010/main" val="3637926162"/>
+      </p:ext>
+    </p:extLst>
+  </p:cSld>
+  <p:clrMapOvr>
+    <a:masterClrMapping/>
+  </p:clrMapOvr>
+</p:sld>
+</file>
+
+<file path=ppt/slides/slide23.xml><?xml version="1.0" encoding="utf-8"?>
 <p:sld xmlns:a="http://schemas.openxmlformats.org/drawingml/2006/main" xmlns:r="http://schemas.openxmlformats.org/officeDocument/2006/relationships" xmlns:p="http://schemas.openxmlformats.org/presentationml/2006/main">
   <p:cSld>
     <p:spTree>
@@ -8878,17 +11191,33 @@
         <p:spPr/>
         <p:txBody>
           <a:bodyPr>
-            <a:normAutofit fontScale="85000" lnSpcReduction="20000"/>
+            <a:normAutofit/>
           </a:bodyPr>
           <a:lstStyle/>
           <a:p>
             <a:r>
               <a:rPr lang="en-GB" dirty="0"/>
-              <a:t>Close IN.WS3 from </a:t>
+              <a:t>Clone IN.WS3 from </a:t>
             </a:r>
             <a:r>
               <a:rPr lang="en-GB" dirty="0" err="1"/>
               <a:t>github</a:t>
+            </a:r>
+            <a:endParaRPr lang="en-GB" dirty="0"/>
+          </a:p>
+          <a:p>
+            <a:pPr lvl="1"/>
+            <a:r>
+              <a:rPr lang="en-GB" dirty="0" err="1"/>
+              <a:t>cmd</a:t>
+            </a:r>
+            <a:r>
+              <a:rPr lang="en-GB" dirty="0"/>
+              <a:t> line  // </a:t>
+            </a:r>
+            <a:r>
+              <a:rPr lang="en-GB" dirty="0" err="1"/>
+              <a:t>powershell</a:t>
             </a:r>
             <a:endParaRPr lang="en-GB" dirty="0"/>
           </a:p>
@@ -8925,7 +11254,30 @@
             <a:pPr lvl="1"/>
             <a:r>
               <a:rPr lang="en-GB" dirty="0"/>
-              <a:t>Cd IN.WS3 then NPM I ( to pull </a:t>
+              <a:t>Cd IN.WS3 </a:t>
+            </a:r>
+          </a:p>
+          <a:p>
+            <a:pPr lvl="1"/>
+            <a:r>
+              <a:rPr lang="en-GB" dirty="0"/>
+              <a:t>then </a:t>
+            </a:r>
+            <a:r>
+              <a:rPr lang="en-GB" b="1" i="1" dirty="0" err="1"/>
+              <a:t>npm</a:t>
+            </a:r>
+            <a:r>
+              <a:rPr lang="en-GB" b="1" i="1" dirty="0"/>
+              <a:t> </a:t>
+            </a:r>
+            <a:r>
+              <a:rPr lang="en-GB" b="1" i="1" dirty="0" err="1"/>
+              <a:t>i</a:t>
+            </a:r>
+            <a:r>
+              <a:rPr lang="en-GB" dirty="0"/>
+              <a:t> ( to pull </a:t>
             </a:r>
             <a:r>
               <a:rPr lang="en-GB" dirty="0" err="1"/>
@@ -8934,68 +11286,6 @@
             <a:r>
               <a:rPr lang="en-GB" dirty="0"/>
               <a:t>)</a:t>
-            </a:r>
-          </a:p>
-          <a:p>
-            <a:r>
-              <a:rPr lang="en-GB" dirty="0"/>
-              <a:t>The create your own application</a:t>
-            </a:r>
-          </a:p>
-          <a:p>
-            <a:pPr lvl="1"/>
-            <a:r>
-              <a:rPr lang="en-GB" dirty="0"/>
-              <a:t>Cd .. </a:t>
-            </a:r>
-          </a:p>
-          <a:p>
-            <a:pPr lvl="1"/>
-            <a:r>
-              <a:rPr lang="en-GB" dirty="0"/>
-              <a:t>md projects</a:t>
-            </a:r>
-          </a:p>
-          <a:p>
-            <a:pPr lvl="1"/>
-            <a:r>
-              <a:rPr lang="en-GB" dirty="0"/>
-              <a:t>cd projects</a:t>
-            </a:r>
-          </a:p>
-          <a:p>
-            <a:pPr lvl="1"/>
-            <a:r>
-              <a:rPr lang="en-GB" dirty="0"/>
-              <a:t>ng new ex1	// create application</a:t>
-            </a:r>
-          </a:p>
-          <a:p>
-            <a:pPr lvl="1"/>
-            <a:r>
-              <a:rPr lang="en-GB" dirty="0"/>
-              <a:t>cd ex1</a:t>
-            </a:r>
-          </a:p>
-          <a:p>
-            <a:pPr lvl="1"/>
-            <a:r>
-              <a:rPr lang="en-GB" dirty="0"/>
-              <a:t>ng serve –open</a:t>
-            </a:r>
-          </a:p>
-          <a:p>
-            <a:pPr lvl="1"/>
-            <a:r>
-              <a:rPr lang="en-GB" dirty="0"/>
-              <a:t>App will be running on your browser</a:t>
-            </a:r>
-          </a:p>
-          <a:p>
-            <a:pPr lvl="1"/>
-            <a:r>
-              <a:rPr lang="en-GB" dirty="0"/>
-              <a:t>Forget IE and use chrome</a:t>
             </a:r>
           </a:p>
           <a:p>
@@ -9080,7 +11370,7 @@
           <p:cNvPr id="2" name="Content Placeholder 1">
             <a:extLst>
               <a:ext uri="{FF2B5EF4-FFF2-40B4-BE49-F238E27FC236}">
-                <a16:creationId xmlns:a16="http://schemas.microsoft.com/office/drawing/2014/main" id="{E57AB6A8-9B56-4F42-BA1F-D0BB1F9C0609}"/>
+                <a16:creationId xmlns:a16="http://schemas.microsoft.com/office/drawing/2014/main" id="{74A0DDF0-1390-48F5-8871-ACD0459876DF}"/>
               </a:ext>
             </a:extLst>
           </p:cNvPr>
@@ -9093,84 +11383,87 @@
         </p:nvSpPr>
         <p:spPr/>
         <p:txBody>
-          <a:bodyPr/>
+          <a:bodyPr>
+            <a:normAutofit/>
+          </a:bodyPr>
           <a:lstStyle/>
           <a:p>
             <a:r>
               <a:rPr lang="en-GB" dirty="0"/>
-              <a:t>Project structure</a:t>
+              <a:t>The create your own application</a:t>
             </a:r>
           </a:p>
           <a:p>
             <a:pPr lvl="1"/>
             <a:r>
+              <a:rPr lang="en-GB" dirty="0"/>
+              <a:t>Dir: &lt;</a:t>
+            </a:r>
+            <a:r>
               <a:rPr lang="en-GB" dirty="0" err="1"/>
-              <a:t>Node_modules</a:t>
-            </a:r>
-            <a:r>
-              <a:rPr lang="en-GB" dirty="0"/>
-              <a:t> – </a:t>
+              <a:t>somedir</a:t>
+            </a:r>
+            <a:r>
+              <a:rPr lang="en-GB" dirty="0"/>
+              <a:t>&gt;/IN.WS3</a:t>
+            </a:r>
+          </a:p>
+          <a:p>
+            <a:pPr lvl="1"/>
+            <a:r>
+              <a:rPr lang="en-GB" dirty="0"/>
+              <a:t>&lt;</a:t>
             </a:r>
             <a:r>
               <a:rPr lang="en-GB" dirty="0" err="1"/>
-              <a:t>npm</a:t>
-            </a:r>
-            <a:r>
-              <a:rPr lang="en-GB" dirty="0"/>
-              <a:t> </a:t>
-            </a:r>
-            <a:r>
-              <a:rPr lang="en-GB" dirty="0" err="1"/>
-              <a:t>eg</a:t>
-            </a:r>
-            <a:r>
-              <a:rPr lang="en-GB" dirty="0"/>
-              <a:t> </a:t>
-            </a:r>
-            <a:r>
-              <a:rPr lang="en-GB" dirty="0" err="1"/>
-              <a:t>ngx</a:t>
-            </a:r>
-            <a:r>
-              <a:rPr lang="en-GB" dirty="0"/>
-              <a:t>-charts</a:t>
+              <a:t>somedir</a:t>
+            </a:r>
+            <a:r>
+              <a:rPr lang="en-GB" dirty="0"/>
+              <a:t>:\&gt;</a:t>
             </a:r>
           </a:p>
           <a:p>
             <a:pPr lvl="1"/>
             <a:r>
-              <a:rPr lang="en-GB" dirty="0" err="1"/>
-              <a:t>src</a:t>
-            </a:r>
-            <a:r>
-              <a:rPr lang="en-GB" dirty="0"/>
-              <a:t>\app</a:t>
+              <a:rPr lang="en-GB" dirty="0"/>
+              <a:t>ng new ex1	// create application</a:t>
             </a:r>
           </a:p>
           <a:p>
             <a:pPr lvl="1"/>
             <a:r>
               <a:rPr lang="en-GB" dirty="0"/>
-              <a:t>Index.html</a:t>
+              <a:t>cd ex1</a:t>
             </a:r>
           </a:p>
           <a:p>
             <a:pPr lvl="1"/>
             <a:r>
-              <a:rPr lang="en-GB" dirty="0" err="1"/>
-              <a:t>app.module.ts</a:t>
-            </a:r>
-            <a:endParaRPr lang="en-GB" dirty="0"/>
+              <a:rPr lang="en-GB" dirty="0"/>
+              <a:t>ng serve –open</a:t>
+            </a:r>
           </a:p>
           <a:p>
             <a:pPr lvl="1"/>
             <a:r>
-              <a:rPr lang="en-GB" dirty="0" err="1"/>
-              <a:t>app.component.ts</a:t>
-            </a:r>
-            <a:r>
-              <a:rPr lang="en-GB" dirty="0"/>
-              <a:t> // html</a:t>
+              <a:rPr lang="en-GB" dirty="0"/>
+              <a:t>App will be running on your browser</a:t>
+            </a:r>
+          </a:p>
+          <a:p>
+            <a:pPr lvl="1"/>
+            <a:r>
+              <a:rPr lang="en-GB" dirty="0"/>
+              <a:t>Forget IE and use chrome, </a:t>
+            </a:r>
+            <a:r>
+              <a:rPr lang="en-GB" b="1" dirty="0"/>
+              <a:t>much better </a:t>
+            </a:r>
+            <a:r>
+              <a:rPr lang="en-GB" dirty="0"/>
+              <a:t>dev tools !</a:t>
             </a:r>
           </a:p>
           <a:p>
@@ -9179,19 +11472,10 @@
           </a:p>
           <a:p>
             <a:pPr lvl="1"/>
-            <a:r>
-              <a:rPr lang="en-GB" dirty="0">
-                <a:hlinkClick r:id="rId2"/>
-              </a:rPr>
-              <a:t>https://www.udemy.com/the-complete-guide-to-angular-2/learn/v4/t/lecture/10415892?start=0</a:t>
-            </a:r>
             <a:endParaRPr lang="en-GB" dirty="0"/>
           </a:p>
           <a:p>
             <a:pPr lvl="1"/>
-            <a:endParaRPr lang="en-GB" dirty="0"/>
-          </a:p>
-          <a:p>
             <a:endParaRPr lang="en-GB" dirty="0"/>
           </a:p>
         </p:txBody>
@@ -9201,7 +11485,7 @@
           <p:cNvPr id="3" name="Title 2">
             <a:extLst>
               <a:ext uri="{FF2B5EF4-FFF2-40B4-BE49-F238E27FC236}">
-                <a16:creationId xmlns:a16="http://schemas.microsoft.com/office/drawing/2014/main" id="{B436C8DD-B0D4-45A6-9941-CE0474D20E49}"/>
+                <a16:creationId xmlns:a16="http://schemas.microsoft.com/office/drawing/2014/main" id="{F7F9F412-24E1-4F23-8DA5-D76D3EFF48C2}"/>
               </a:ext>
             </a:extLst>
           </p:cNvPr>
@@ -9212,14 +11496,19 @@
             <p:ph type="title"/>
           </p:nvPr>
         </p:nvSpPr>
-        <p:spPr/>
+        <p:spPr>
+          <a:xfrm>
+            <a:off x="570000" y="504000"/>
+            <a:ext cx="11052000" cy="720000"/>
+          </a:xfrm>
+        </p:spPr>
         <p:txBody>
           <a:bodyPr/>
           <a:lstStyle/>
           <a:p>
             <a:r>
               <a:rPr lang="en-GB" dirty="0"/>
-              <a:t>ex1 - First App</a:t>
+              <a:t>Building your first app</a:t>
             </a:r>
           </a:p>
         </p:txBody>
@@ -9227,7 +11516,7 @@
     </p:spTree>
     <p:extLst>
       <p:ext uri="{BB962C8B-B14F-4D97-AF65-F5344CB8AC3E}">
-        <p14:creationId xmlns:p14="http://schemas.microsoft.com/office/powerpoint/2010/main" val="1638000734"/>
+        <p14:creationId xmlns:p14="http://schemas.microsoft.com/office/powerpoint/2010/main" val="313388440"/>
       </p:ext>
     </p:extLst>
   </p:cSld>

</xml_diff>